<commit_message>
Fixed post-defense for overhead table and explanation. Bit pack to Bit-pack
</commit_message>
<xml_diff>
--- a/fig/maximum_packet_overhead.pptx
+++ b/fig/maximum_packet_overhead.pptx
@@ -104,6 +104,11 @@
       </a:defRPr>
     </a:lvl9pPr>
   </p:defaultTextStyle>
+  <p:extLst>
+    <p:ext uri="{EFAFB233-063F-42B5-8137-9DF3F51BA10A}">
+      <p15:sldGuideLst xmlns:p15="http://schemas.microsoft.com/office/powerpoint/2012/main"/>
+    </p:ext>
+  </p:extLst>
 </p:presentation>
 </file>
 
@@ -238,7 +243,7 @@
           <a:p>
             <a:fld id="{E454B822-846B-44CA-B380-D72A2BE3D9BB}" type="datetimeFigureOut">
               <a:rPr lang="en-US" smtClean="0"/>
-              <a:t>11/30/2020</a:t>
+              <a:t>12/4/2020</a:t>
             </a:fld>
             <a:endParaRPr lang="en-US"/>
           </a:p>
@@ -408,7 +413,7 @@
           <a:p>
             <a:fld id="{E454B822-846B-44CA-B380-D72A2BE3D9BB}" type="datetimeFigureOut">
               <a:rPr lang="en-US" smtClean="0"/>
-              <a:t>11/30/2020</a:t>
+              <a:t>12/4/2020</a:t>
             </a:fld>
             <a:endParaRPr lang="en-US"/>
           </a:p>
@@ -588,7 +593,7 @@
           <a:p>
             <a:fld id="{E454B822-846B-44CA-B380-D72A2BE3D9BB}" type="datetimeFigureOut">
               <a:rPr lang="en-US" smtClean="0"/>
-              <a:t>11/30/2020</a:t>
+              <a:t>12/4/2020</a:t>
             </a:fld>
             <a:endParaRPr lang="en-US"/>
           </a:p>
@@ -758,7 +763,7 @@
           <a:p>
             <a:fld id="{E454B822-846B-44CA-B380-D72A2BE3D9BB}" type="datetimeFigureOut">
               <a:rPr lang="en-US" smtClean="0"/>
-              <a:t>11/30/2020</a:t>
+              <a:t>12/4/2020</a:t>
             </a:fld>
             <a:endParaRPr lang="en-US"/>
           </a:p>
@@ -1002,7 +1007,7 @@
           <a:p>
             <a:fld id="{E454B822-846B-44CA-B380-D72A2BE3D9BB}" type="datetimeFigureOut">
               <a:rPr lang="en-US" smtClean="0"/>
-              <a:t>11/30/2020</a:t>
+              <a:t>12/4/2020</a:t>
             </a:fld>
             <a:endParaRPr lang="en-US"/>
           </a:p>
@@ -1234,7 +1239,7 @@
           <a:p>
             <a:fld id="{E454B822-846B-44CA-B380-D72A2BE3D9BB}" type="datetimeFigureOut">
               <a:rPr lang="en-US" smtClean="0"/>
-              <a:t>11/30/2020</a:t>
+              <a:t>12/4/2020</a:t>
             </a:fld>
             <a:endParaRPr lang="en-US"/>
           </a:p>
@@ -1601,7 +1606,7 @@
           <a:p>
             <a:fld id="{E454B822-846B-44CA-B380-D72A2BE3D9BB}" type="datetimeFigureOut">
               <a:rPr lang="en-US" smtClean="0"/>
-              <a:t>11/30/2020</a:t>
+              <a:t>12/4/2020</a:t>
             </a:fld>
             <a:endParaRPr lang="en-US"/>
           </a:p>
@@ -1719,7 +1724,7 @@
           <a:p>
             <a:fld id="{E454B822-846B-44CA-B380-D72A2BE3D9BB}" type="datetimeFigureOut">
               <a:rPr lang="en-US" smtClean="0"/>
-              <a:t>11/30/2020</a:t>
+              <a:t>12/4/2020</a:t>
             </a:fld>
             <a:endParaRPr lang="en-US"/>
           </a:p>
@@ -1814,7 +1819,7 @@
           <a:p>
             <a:fld id="{E454B822-846B-44CA-B380-D72A2BE3D9BB}" type="datetimeFigureOut">
               <a:rPr lang="en-US" smtClean="0"/>
-              <a:t>11/30/2020</a:t>
+              <a:t>12/4/2020</a:t>
             </a:fld>
             <a:endParaRPr lang="en-US"/>
           </a:p>
@@ -2091,7 +2096,7 @@
           <a:p>
             <a:fld id="{E454B822-846B-44CA-B380-D72A2BE3D9BB}" type="datetimeFigureOut">
               <a:rPr lang="en-US" smtClean="0"/>
-              <a:t>11/30/2020</a:t>
+              <a:t>12/4/2020</a:t>
             </a:fld>
             <a:endParaRPr lang="en-US"/>
           </a:p>
@@ -2348,7 +2353,7 @@
           <a:p>
             <a:fld id="{E454B822-846B-44CA-B380-D72A2BE3D9BB}" type="datetimeFigureOut">
               <a:rPr lang="en-US" smtClean="0"/>
-              <a:t>11/30/2020</a:t>
+              <a:t>12/4/2020</a:t>
             </a:fld>
             <a:endParaRPr lang="en-US"/>
           </a:p>
@@ -2561,7 +2566,7 @@
           <a:p>
             <a:fld id="{E454B822-846B-44CA-B380-D72A2BE3D9BB}" type="datetimeFigureOut">
               <a:rPr lang="en-US" smtClean="0"/>
-              <a:t>11/30/2020</a:t>
+              <a:t>12/4/2020</a:t>
             </a:fld>
             <a:endParaRPr lang="en-US"/>
           </a:p>
@@ -2981,14 +2986,14 @@
           <p:nvPr>
             <p:extLst>
               <p:ext uri="{D42A27DB-BD31-4B8C-83A1-F6EECF244321}">
-                <p14:modId xmlns:p14="http://schemas.microsoft.com/office/powerpoint/2010/main" val="1794816151"/>
+                <p14:modId xmlns:p14="http://schemas.microsoft.com/office/powerpoint/2010/main" val="3007758097"/>
               </p:ext>
             </p:extLst>
           </p:nvPr>
         </p:nvGraphicFramePr>
         <p:xfrm>
-          <a:off x="2612571" y="1299212"/>
-          <a:ext cx="6966858" cy="7932423"/>
+          <a:off x="2988728" y="829065"/>
+          <a:ext cx="6214544" cy="6309402"/>
         </p:xfrm>
         <a:graphic>
           <a:graphicData uri="http://schemas.openxmlformats.org/drawingml/2006/table">
@@ -2997,42 +3002,49 @@
                 <a:tableStyleId>{D7AC3CCA-C797-4891-BE02-D94E43425B78}</a:tableStyleId>
               </a:tblPr>
               <a:tblGrid>
-                <a:gridCol w="1161143">
+                <a:gridCol w="887792">
                   <a:extLst>
                     <a:ext uri="{9D8B030D-6E8A-4147-A177-3AD203B41FA5}">
                       <a16:colId xmlns:a16="http://schemas.microsoft.com/office/drawing/2014/main" val="1943013709"/>
                     </a:ext>
                   </a:extLst>
                 </a:gridCol>
-                <a:gridCol w="1161143">
+                <a:gridCol w="887792">
                   <a:extLst>
                     <a:ext uri="{9D8B030D-6E8A-4147-A177-3AD203B41FA5}">
                       <a16:colId xmlns:a16="http://schemas.microsoft.com/office/drawing/2014/main" val="3501073706"/>
                     </a:ext>
                   </a:extLst>
                 </a:gridCol>
-                <a:gridCol w="1161143">
+                <a:gridCol w="887792">
+                  <a:extLst>
+                    <a:ext uri="{9D8B030D-6E8A-4147-A177-3AD203B41FA5}">
+                      <a16:colId xmlns:a16="http://schemas.microsoft.com/office/drawing/2014/main" val="3168448767"/>
+                    </a:ext>
+                  </a:extLst>
+                </a:gridCol>
+                <a:gridCol w="887792">
                   <a:extLst>
                     <a:ext uri="{9D8B030D-6E8A-4147-A177-3AD203B41FA5}">
                       <a16:colId xmlns:a16="http://schemas.microsoft.com/office/drawing/2014/main" val="1150598794"/>
                     </a:ext>
                   </a:extLst>
                 </a:gridCol>
-                <a:gridCol w="1161143">
+                <a:gridCol w="887792">
                   <a:extLst>
                     <a:ext uri="{9D8B030D-6E8A-4147-A177-3AD203B41FA5}">
                       <a16:colId xmlns:a16="http://schemas.microsoft.com/office/drawing/2014/main" val="1286218853"/>
                     </a:ext>
                   </a:extLst>
                 </a:gridCol>
-                <a:gridCol w="1161143">
+                <a:gridCol w="887792">
                   <a:extLst>
                     <a:ext uri="{9D8B030D-6E8A-4147-A177-3AD203B41FA5}">
                       <a16:colId xmlns:a16="http://schemas.microsoft.com/office/drawing/2014/main" val="1236566491"/>
                     </a:ext>
                   </a:extLst>
                 </a:gridCol>
-                <a:gridCol w="1161143">
+                <a:gridCol w="887792">
                   <a:extLst>
                     <a:ext uri="{9D8B030D-6E8A-4147-A177-3AD203B41FA5}">
                       <a16:colId xmlns:a16="http://schemas.microsoft.com/office/drawing/2014/main" val="3422485636"/>
@@ -3040,30 +3052,30 @@
                   </a:extLst>
                 </a:gridCol>
               </a:tblGrid>
-              <a:tr h="342900">
-                <a:tc gridSpan="6">
+              <a:tr h="265334">
+                <a:tc gridSpan="7">
                   <a:txBody>
                     <a:bodyPr/>
                     <a:lstStyle/>
                     <a:p>
                       <a:pPr algn="ctr"/>
                       <a:r>
-                        <a:rPr lang="en-US" sz="1600" dirty="0"/>
+                        <a:rPr lang="en-US" sz="1200" dirty="0"/>
                         <a:t>PDP Maximum Packet Overhead</a:t>
                       </a:r>
                     </a:p>
                   </a:txBody>
                   <a:tcPr marT="45721" marB="45721">
-                    <a:lnL w="12700" cap="flat" cmpd="sng" algn="ctr">
-                      <a:solidFill>
-                        <a:srgbClr val="486B7B"/>
-                      </a:solidFill>
-                      <a:prstDash val="solid"/>
-                      <a:round/>
-                      <a:headEnd type="none" w="med" len="med"/>
-                      <a:tailEnd type="none" w="med" len="med"/>
-                    </a:lnL>
-                    <a:lnR w="12700" cap="flat" cmpd="sng" algn="ctr">
+                    <a:lnL w="19050" cap="flat" cmpd="sng" algn="ctr">
+                      <a:solidFill>
+                        <a:srgbClr val="486B7B"/>
+                      </a:solidFill>
+                      <a:prstDash val="solid"/>
+                      <a:round/>
+                      <a:headEnd type="none" w="med" len="med"/>
+                      <a:tailEnd type="none" w="med" len="med"/>
+                    </a:lnL>
+                    <a:lnR w="19050" cap="flat" cmpd="sng" algn="ctr">
                       <a:solidFill>
                         <a:srgbClr val="486B7B"/>
                       </a:solidFill>
@@ -3081,7 +3093,7 @@
                       <a:headEnd type="none" w="med" len="med"/>
                       <a:tailEnd type="none" w="med" len="med"/>
                     </a:lnT>
-                    <a:lnB w="19050" cap="flat" cmpd="sng" algn="ctr">
+                    <a:lnB w="12700" cap="flat" cmpd="sng" algn="ctr">
                       <a:solidFill>
                         <a:srgbClr val="486B7B"/>
                       </a:solidFill>
@@ -3119,6 +3131,16 @@
                     <a:bodyPr/>
                     <a:lstStyle/>
                     <a:p>
+                      <a:endParaRPr lang="en-US"/>
+                    </a:p>
+                  </a:txBody>
+                  <a:tcPr/>
+                </a:tc>
+                <a:tc hMerge="1">
+                  <a:txBody>
+                    <a:bodyPr/>
+                    <a:lstStyle/>
+                    <a:p>
                       <a:pPr algn="ctr"/>
                       <a:endParaRPr lang="en-US" sz="1200" dirty="0"/>
                     </a:p>
@@ -3134,7 +3156,17 @@
                       <a:endParaRPr lang="en-US" sz="1200" dirty="0"/>
                     </a:p>
                   </a:txBody>
-                  <a:tcPr/>
+                  <a:tcPr>
+                    <a:lnL w="12700" cap="flat" cmpd="sng" algn="ctr">
+                      <a:solidFill>
+                        <a:srgbClr val="486B7B"/>
+                      </a:solidFill>
+                      <a:prstDash val="solid"/>
+                      <a:round/>
+                      <a:headEnd type="none" w="med" len="med"/>
+                      <a:tailEnd type="none" w="med" len="med"/>
+                    </a:lnL>
+                  </a:tcPr>
                 </a:tc>
                 <a:tc hMerge="1">
                   <a:txBody>
@@ -3156,7 +3188,17 @@
                       <a:endParaRPr lang="en-US" sz="1200" dirty="0"/>
                     </a:p>
                   </a:txBody>
-                  <a:tcPr/>
+                  <a:tcPr>
+                    <a:lnL w="12700" cap="flat" cmpd="sng" algn="ctr">
+                      <a:solidFill>
+                        <a:srgbClr val="486B7B"/>
+                      </a:solidFill>
+                      <a:prstDash val="solid"/>
+                      <a:round/>
+                      <a:headEnd type="none" w="med" len="med"/>
+                      <a:tailEnd type="none" w="med" len="med"/>
+                    </a:lnL>
+                  </a:tcPr>
                 </a:tc>
                 <a:extLst>
                   <a:ext uri="{0D108BD9-81ED-4DB2-BD59-A6C34878D82A}">
@@ -3164,18 +3206,17 @@
                   </a:ext>
                 </a:extLst>
               </a:tr>
-              <a:tr h="594361">
-                <a:tc gridSpan="2">
+              <a:tr h="442223">
+                <a:tc gridSpan="3">
                   <a:txBody>
                     <a:bodyPr/>
                     <a:lstStyle/>
                     <a:p>
                       <a:pPr algn="ctr"/>
                       <a:r>
-                        <a:rPr lang="en-US" sz="1600" b="1" dirty="0" err="1"/>
-                        <a:t>Modeline</a:t>
-                      </a:r>
-                      <a:endParaRPr lang="en-US" sz="1600" b="1" dirty="0"/>
+                        <a:rPr lang="en-US" sz="1200" b="1" dirty="0"/>
+                        <a:t>Original</a:t>
+                      </a:r>
                     </a:p>
                   </a:txBody>
                   <a:tcPr marT="45721" marB="45721">
@@ -3197,7 +3238,7 @@
                       <a:headEnd type="none" w="med" len="med"/>
                       <a:tailEnd type="none" w="med" len="med"/>
                     </a:lnR>
-                    <a:lnT w="19050" cap="flat" cmpd="sng" algn="ctr">
+                    <a:lnT w="12700" cap="flat" cmpd="sng" algn="ctr">
                       <a:solidFill>
                         <a:srgbClr val="486B7B"/>
                       </a:solidFill>
@@ -3287,6 +3328,16 @@
                     </a:solidFill>
                   </a:tcPr>
                 </a:tc>
+                <a:tc hMerge="1">
+                  <a:txBody>
+                    <a:bodyPr/>
+                    <a:lstStyle/>
+                    <a:p>
+                      <a:endParaRPr lang="en-US"/>
+                    </a:p>
+                  </a:txBody>
+                  <a:tcPr/>
+                </a:tc>
                 <a:tc gridSpan="2">
                   <a:txBody>
                     <a:bodyPr/>
@@ -3294,14 +3345,14 @@
                     <a:p>
                       <a:pPr algn="ctr"/>
                       <a:r>
-                        <a:rPr lang="en-US" sz="1600" b="1" dirty="0"/>
+                        <a:rPr lang="en-US" sz="1200" b="1" dirty="0"/>
                         <a:t>Bit-packed</a:t>
                       </a:r>
                     </a:p>
                     <a:p>
                       <a:pPr algn="ctr"/>
                       <a:r>
-                        <a:rPr lang="en-US" sz="1600" b="1" dirty="0"/>
+                        <a:rPr lang="en-US" sz="1200" b="1" dirty="0"/>
                         <a:t>(13.5% Overhead)</a:t>
                       </a:r>
                     </a:p>
@@ -3364,7 +3415,17 @@
                       <a:endParaRPr lang="en-US" sz="1200" dirty="0"/>
                     </a:p>
                   </a:txBody>
-                  <a:tcPr/>
+                  <a:tcPr>
+                    <a:lnL w="38100" cap="flat" cmpd="sng" algn="ctr">
+                      <a:solidFill>
+                        <a:srgbClr val="486B7B"/>
+                      </a:solidFill>
+                      <a:prstDash val="solid"/>
+                      <a:round/>
+                      <a:headEnd type="none" w="med" len="med"/>
+                      <a:tailEnd type="none" w="med" len="med"/>
+                    </a:lnL>
+                  </a:tcPr>
                 </a:tc>
                 <a:tc gridSpan="2">
                   <a:txBody>
@@ -3373,18 +3434,18 @@
                     <a:p>
                       <a:pPr algn="ctr"/>
                       <a:r>
-                        <a:rPr lang="en-US" sz="1600" b="1" dirty="0"/>
+                        <a:rPr lang="en-US" sz="1200" b="1" dirty="0"/>
                         <a:t>Unpacked</a:t>
                       </a:r>
                     </a:p>
                     <a:p>
                       <a:pPr algn="ctr"/>
                       <a:r>
-                        <a:rPr lang="en-US" sz="1600" b="1" dirty="0"/>
+                        <a:rPr lang="en-US" sz="1200" b="1" dirty="0"/>
                         <a:t>(7.2% Overhead</a:t>
                       </a:r>
                       <a:r>
-                        <a:rPr lang="en-US" sz="1600" dirty="0"/>
+                        <a:rPr lang="en-US" sz="1200" dirty="0"/>
                         <a:t>)</a:t>
                       </a:r>
                     </a:p>
@@ -3447,7 +3508,17 @@
                       <a:endParaRPr lang="en-US" sz="1200" dirty="0"/>
                     </a:p>
                   </a:txBody>
-                  <a:tcPr/>
+                  <a:tcPr>
+                    <a:lnL w="19050" cap="flat" cmpd="sng" algn="ctr">
+                      <a:solidFill>
+                        <a:srgbClr val="486B7B"/>
+                      </a:solidFill>
+                      <a:prstDash val="solid"/>
+                      <a:round/>
+                      <a:headEnd type="none" w="med" len="med"/>
+                      <a:tailEnd type="none" w="med" len="med"/>
+                    </a:lnL>
+                  </a:tcPr>
                 </a:tc>
                 <a:extLst>
                   <a:ext uri="{0D108BD9-81ED-4DB2-BD59-A6C34878D82A}">
@@ -3455,7 +3526,7 @@
                   </a:ext>
                 </a:extLst>
               </a:tr>
-              <a:tr h="342900">
+              <a:tr h="619111">
                 <a:tc>
                   <a:txBody>
                     <a:bodyPr/>
@@ -3463,7 +3534,7 @@
                     <a:p>
                       <a:pPr algn="ctr"/>
                       <a:r>
-                        <a:rPr lang="en-US" sz="1600" b="1" dirty="0"/>
+                        <a:rPr lang="en-US" sz="1200" b="1" dirty="0"/>
                         <a:t>Resolution</a:t>
                       </a:r>
                     </a:p>
@@ -3541,8 +3612,85 @@
                         <a:defRPr/>
                       </a:pPr>
                       <a:r>
-                        <a:rPr lang="en-US" sz="1600" b="1" dirty="0"/>
-                        <a:t>Framerate (Hz)</a:t>
+                        <a:rPr lang="en-US" sz="1200" b="1" dirty="0"/>
+                        <a:t>Frame rate (Hz)</a:t>
+                      </a:r>
+                    </a:p>
+                  </a:txBody>
+                  <a:tcPr marT="45721" marB="45721">
+                    <a:lnL w="12700" cap="flat" cmpd="sng" algn="ctr">
+                      <a:solidFill>
+                        <a:srgbClr val="486B7B"/>
+                      </a:solidFill>
+                      <a:prstDash val="solid"/>
+                      <a:round/>
+                      <a:headEnd type="none" w="med" len="med"/>
+                      <a:tailEnd type="none" w="med" len="med"/>
+                    </a:lnL>
+                    <a:lnR w="12700" cap="flat" cmpd="sng" algn="ctr">
+                      <a:solidFill>
+                        <a:srgbClr val="486B7B"/>
+                      </a:solidFill>
+                      <a:prstDash val="solid"/>
+                      <a:round/>
+                      <a:headEnd type="none" w="med" len="med"/>
+                      <a:tailEnd type="none" w="med" len="med"/>
+                    </a:lnR>
+                    <a:lnT w="12700" cap="flat" cmpd="sng" algn="ctr">
+                      <a:solidFill>
+                        <a:srgbClr val="486B7B"/>
+                      </a:solidFill>
+                      <a:prstDash val="solid"/>
+                      <a:round/>
+                      <a:headEnd type="none" w="med" len="med"/>
+                      <a:tailEnd type="none" w="med" len="med"/>
+                    </a:lnT>
+                    <a:lnB w="12700" cap="flat" cmpd="sng" algn="ctr">
+                      <a:solidFill>
+                        <a:srgbClr val="486B7B"/>
+                      </a:solidFill>
+                      <a:prstDash val="solid"/>
+                      <a:round/>
+                      <a:headEnd type="none" w="med" len="med"/>
+                      <a:tailEnd type="none" w="med" len="med"/>
+                    </a:lnB>
+                    <a:lnTlToBr w="12700" cmpd="sng">
+                      <a:noFill/>
+                      <a:prstDash val="solid"/>
+                    </a:lnTlToBr>
+                    <a:lnBlToTr w="12700" cmpd="sng">
+                      <a:noFill/>
+                      <a:prstDash val="solid"/>
+                    </a:lnBlToTr>
+                    <a:solidFill>
+                      <a:srgbClr val="D8E3E9"/>
+                    </a:solidFill>
+                  </a:tcPr>
+                </a:tc>
+                <a:tc>
+                  <a:txBody>
+                    <a:bodyPr/>
+                    <a:lstStyle/>
+                    <a:p>
+                      <a:pPr algn="ctr"/>
+                      <a:r>
+                        <a:rPr lang="en-US" sz="1200" b="1" dirty="0" err="1"/>
+                        <a:t>Modeline</a:t>
+                      </a:r>
+                      <a:endParaRPr lang="en-US" sz="1200" b="1" dirty="0"/>
+                    </a:p>
+                    <a:p>
+                      <a:pPr algn="ctr"/>
+                      <a:r>
+                        <a:rPr lang="en-US" sz="1200" b="1" dirty="0"/>
+                        <a:t>Overhead</a:t>
+                      </a:r>
+                    </a:p>
+                    <a:p>
+                      <a:pPr algn="ctr"/>
+                      <a:r>
+                        <a:rPr lang="en-US" sz="1200" b="1" dirty="0"/>
+                        <a:t>(%)</a:t>
                       </a:r>
                     </a:p>
                   </a:txBody>
@@ -3619,13 +3767,13 @@
                         <a:defRPr/>
                       </a:pPr>
                       <a:r>
-                        <a:rPr lang="en-US" sz="1600" b="1" dirty="0"/>
+                        <a:rPr lang="en-US" sz="1200" b="1" dirty="0"/>
                         <a:t>Total Pixels</a:t>
                       </a:r>
                     </a:p>
                     <a:p>
                       <a:pPr algn="ctr"/>
-                      <a:endParaRPr lang="en-US" sz="1600" dirty="0"/>
+                      <a:endParaRPr lang="en-US" sz="1200" dirty="0"/>
                     </a:p>
                   </a:txBody>
                   <a:tcPr marT="45721" marB="45721">
@@ -3701,7 +3849,7 @@
                         <a:defRPr/>
                       </a:pPr>
                       <a:r>
-                        <a:rPr lang="en-US" sz="1600" b="1" dirty="0"/>
+                        <a:rPr lang="en-US" sz="1200" b="1" dirty="0"/>
                         <a:t>Overhead Reduction (%)</a:t>
                       </a:r>
                     </a:p>
@@ -3779,13 +3927,13 @@
                         <a:defRPr/>
                       </a:pPr>
                       <a:r>
-                        <a:rPr lang="en-US" sz="1600" b="1" dirty="0"/>
+                        <a:rPr lang="en-US" sz="1200" b="1" dirty="0"/>
                         <a:t>Total Pixels</a:t>
                       </a:r>
                     </a:p>
                     <a:p>
                       <a:pPr algn="ctr"/>
-                      <a:endParaRPr lang="en-US" sz="1600" dirty="0"/>
+                      <a:endParaRPr lang="en-US" sz="1200" dirty="0"/>
                     </a:p>
                   </a:txBody>
                   <a:tcPr marT="45721" marB="45721">
@@ -3861,7 +4009,7 @@
                         <a:defRPr/>
                       </a:pPr>
                       <a:r>
-                        <a:rPr lang="en-US" sz="1600" b="1" dirty="0"/>
+                        <a:rPr lang="en-US" sz="1200" b="1" dirty="0"/>
                         <a:t>Overhead Reduction (%)</a:t>
                       </a:r>
                     </a:p>
@@ -3922,7 +4070,7 @@
                   </a:ext>
                 </a:extLst>
               </a:tr>
-              <a:tr h="342900">
+              <a:tr h="265334">
                 <a:tc>
                   <a:txBody>
                     <a:bodyPr/>
@@ -3930,7 +4078,7 @@
                     <a:p>
                       <a:pPr algn="ctr"/>
                       <a:r>
-                        <a:rPr lang="en-US" sz="1600" b="1" kern="1200" dirty="0">
+                        <a:rPr lang="en-US" sz="1200" b="1" kern="1200" dirty="0">
                           <a:solidFill>
                             <a:schemeClr val="dk1"/>
                           </a:solidFill>
@@ -3938,7 +4086,7 @@
                         </a:rPr>
                         <a:t>1920x1080</a:t>
                       </a:r>
-                      <a:endParaRPr lang="en-US" sz="1600" b="1" dirty="0"/>
+                      <a:endParaRPr lang="en-US" sz="1200" b="1" dirty="0"/>
                     </a:p>
                   </a:txBody>
                   <a:tcPr marT="45721" marB="45721">
@@ -3998,7 +4146,7 @@
                     <a:p>
                       <a:pPr algn="ctr"/>
                       <a:r>
-                        <a:rPr lang="en-US" sz="1600" b="1" dirty="0"/>
+                        <a:rPr lang="en-US" sz="1200" b="1" dirty="0"/>
                         <a:t>60</a:t>
                       </a:r>
                     </a:p>
@@ -4013,6 +4161,68 @@
                       <a:headEnd type="none" w="med" len="med"/>
                       <a:tailEnd type="none" w="med" len="med"/>
                     </a:lnL>
+                    <a:lnR w="12700" cap="flat" cmpd="sng" algn="ctr">
+                      <a:solidFill>
+                        <a:srgbClr val="486B7B"/>
+                      </a:solidFill>
+                      <a:prstDash val="solid"/>
+                      <a:round/>
+                      <a:headEnd type="none" w="med" len="med"/>
+                      <a:tailEnd type="none" w="med" len="med"/>
+                    </a:lnR>
+                    <a:lnT w="12700" cap="flat" cmpd="sng" algn="ctr">
+                      <a:solidFill>
+                        <a:srgbClr val="486B7B"/>
+                      </a:solidFill>
+                      <a:prstDash val="solid"/>
+                      <a:round/>
+                      <a:headEnd type="none" w="med" len="med"/>
+                      <a:tailEnd type="none" w="med" len="med"/>
+                    </a:lnT>
+                    <a:lnB w="12700" cap="flat" cmpd="sng" algn="ctr">
+                      <a:solidFill>
+                        <a:srgbClr val="486B7B"/>
+                      </a:solidFill>
+                      <a:prstDash val="solid"/>
+                      <a:round/>
+                      <a:headEnd type="none" w="med" len="med"/>
+                      <a:tailEnd type="none" w="med" len="med"/>
+                    </a:lnB>
+                    <a:lnTlToBr w="12700" cmpd="sng">
+                      <a:noFill/>
+                      <a:prstDash val="solid"/>
+                    </a:lnTlToBr>
+                    <a:lnBlToTr w="12700" cmpd="sng">
+                      <a:noFill/>
+                      <a:prstDash val="solid"/>
+                    </a:lnBlToTr>
+                    <a:solidFill>
+                      <a:schemeClr val="bg1"/>
+                    </a:solidFill>
+                  </a:tcPr>
+                </a:tc>
+                <a:tc>
+                  <a:txBody>
+                    <a:bodyPr/>
+                    <a:lstStyle/>
+                    <a:p>
+                      <a:pPr algn="ctr"/>
+                      <a:r>
+                        <a:rPr lang="en-US" sz="1200" dirty="0"/>
+                        <a:t>16.2</a:t>
+                      </a:r>
+                    </a:p>
+                  </a:txBody>
+                  <a:tcPr marT="45721" marB="45721">
+                    <a:lnL w="12700" cap="flat" cmpd="sng" algn="ctr">
+                      <a:solidFill>
+                        <a:srgbClr val="486B7B"/>
+                      </a:solidFill>
+                      <a:prstDash val="solid"/>
+                      <a:round/>
+                      <a:headEnd type="none" w="med" len="med"/>
+                      <a:tailEnd type="none" w="med" len="med"/>
+                    </a:lnL>
                     <a:lnR w="38100" cap="flat" cmpd="sng" algn="ctr">
                       <a:solidFill>
                         <a:srgbClr val="486B7B"/>
@@ -4060,7 +4270,7 @@
                     <a:p>
                       <a:pPr algn="ctr"/>
                       <a:r>
-                        <a:rPr lang="en-US" sz="1600" dirty="0"/>
+                        <a:rPr lang="en-US" sz="1200" dirty="0"/>
                         <a:t>2397600</a:t>
                       </a:r>
                     </a:p>
@@ -4122,7 +4332,7 @@
                     <a:p>
                       <a:pPr algn="ctr"/>
                       <a:r>
-                        <a:rPr lang="en-US" sz="1600" dirty="0"/>
+                        <a:rPr lang="en-US" sz="1200" dirty="0"/>
                         <a:t>2.7</a:t>
                       </a:r>
                     </a:p>
@@ -4184,7 +4394,7 @@
                     <a:p>
                       <a:pPr algn="ctr"/>
                       <a:r>
-                        <a:rPr lang="en-US" sz="1600" dirty="0"/>
+                        <a:rPr lang="en-US" sz="1200" dirty="0"/>
                         <a:t>2235600</a:t>
                       </a:r>
                     </a:p>
@@ -4246,7 +4456,7 @@
                     <a:p>
                       <a:pPr algn="ctr"/>
                       <a:r>
-                        <a:rPr lang="en-US" sz="1600" dirty="0"/>
+                        <a:rPr lang="en-US" sz="1200" dirty="0"/>
                         <a:t>9.0</a:t>
                       </a:r>
                     </a:p>
@@ -4307,7 +4517,7 @@
                   </a:ext>
                 </a:extLst>
               </a:tr>
-              <a:tr h="342900">
+              <a:tr h="265334">
                 <a:tc>
                   <a:txBody>
                     <a:bodyPr/>
@@ -4315,7 +4525,7 @@
                     <a:p>
                       <a:pPr algn="ctr"/>
                       <a:r>
-                        <a:rPr lang="en-US" sz="1600" b="1" kern="1200" dirty="0">
+                        <a:rPr lang="en-US" sz="1200" b="1" kern="1200" dirty="0">
                           <a:solidFill>
                             <a:schemeClr val="dk1"/>
                           </a:solidFill>
@@ -4323,7 +4533,7 @@
                         </a:rPr>
                         <a:t>1600x1200</a:t>
                       </a:r>
-                      <a:endParaRPr lang="en-US" sz="1600" b="1" dirty="0"/>
+                      <a:endParaRPr lang="en-US" sz="1200" b="1" dirty="0"/>
                     </a:p>
                   </a:txBody>
                   <a:tcPr marT="45721" marB="45721">
@@ -4383,7 +4593,7 @@
                     <a:p>
                       <a:pPr algn="ctr"/>
                       <a:r>
-                        <a:rPr lang="en-US" sz="1600" b="1" dirty="0"/>
+                        <a:rPr lang="en-US" sz="1200" b="1" dirty="0"/>
                         <a:t>60</a:t>
                       </a:r>
                     </a:p>
@@ -4398,6 +4608,68 @@
                       <a:headEnd type="none" w="med" len="med"/>
                       <a:tailEnd type="none" w="med" len="med"/>
                     </a:lnL>
+                    <a:lnR w="12700" cap="flat" cmpd="sng" algn="ctr">
+                      <a:solidFill>
+                        <a:srgbClr val="486B7B"/>
+                      </a:solidFill>
+                      <a:prstDash val="solid"/>
+                      <a:round/>
+                      <a:headEnd type="none" w="med" len="med"/>
+                      <a:tailEnd type="none" w="med" len="med"/>
+                    </a:lnR>
+                    <a:lnT w="12700" cap="flat" cmpd="sng" algn="ctr">
+                      <a:solidFill>
+                        <a:srgbClr val="486B7B"/>
+                      </a:solidFill>
+                      <a:prstDash val="solid"/>
+                      <a:round/>
+                      <a:headEnd type="none" w="med" len="med"/>
+                      <a:tailEnd type="none" w="med" len="med"/>
+                    </a:lnT>
+                    <a:lnB w="12700" cap="flat" cmpd="sng" algn="ctr">
+                      <a:solidFill>
+                        <a:srgbClr val="486B7B"/>
+                      </a:solidFill>
+                      <a:prstDash val="solid"/>
+                      <a:round/>
+                      <a:headEnd type="none" w="med" len="med"/>
+                      <a:tailEnd type="none" w="med" len="med"/>
+                    </a:lnB>
+                    <a:lnTlToBr w="12700" cmpd="sng">
+                      <a:noFill/>
+                      <a:prstDash val="solid"/>
+                    </a:lnTlToBr>
+                    <a:lnBlToTr w="12700" cmpd="sng">
+                      <a:noFill/>
+                      <a:prstDash val="solid"/>
+                    </a:lnBlToTr>
+                    <a:solidFill>
+                      <a:schemeClr val="bg1"/>
+                    </a:solidFill>
+                  </a:tcPr>
+                </a:tc>
+                <a:tc>
+                  <a:txBody>
+                    <a:bodyPr/>
+                    <a:lstStyle/>
+                    <a:p>
+                      <a:pPr algn="ctr"/>
+                      <a:r>
+                        <a:rPr lang="en-US" sz="1200" dirty="0"/>
+                        <a:t>28.9</a:t>
+                      </a:r>
+                    </a:p>
+                  </a:txBody>
+                  <a:tcPr marT="45721" marB="45721">
+                    <a:lnL w="12700" cap="flat" cmpd="sng" algn="ctr">
+                      <a:solidFill>
+                        <a:srgbClr val="486B7B"/>
+                      </a:solidFill>
+                      <a:prstDash val="solid"/>
+                      <a:round/>
+                      <a:headEnd type="none" w="med" len="med"/>
+                      <a:tailEnd type="none" w="med" len="med"/>
+                    </a:lnL>
                     <a:lnR w="38100" cap="flat" cmpd="sng" algn="ctr">
                       <a:solidFill>
                         <a:srgbClr val="486B7B"/>
@@ -4445,7 +4717,7 @@
                     <a:p>
                       <a:pPr algn="ctr"/>
                       <a:r>
-                        <a:rPr lang="en-US" sz="1600" dirty="0"/>
+                        <a:rPr lang="en-US" sz="1200" dirty="0"/>
                         <a:t>222000</a:t>
                       </a:r>
                     </a:p>
@@ -4523,7 +4795,7 @@
                         <a:defRPr/>
                       </a:pPr>
                       <a:r>
-                        <a:rPr lang="en-US" sz="1600" dirty="0"/>
+                        <a:rPr lang="en-US" sz="1200" dirty="0"/>
                         <a:t>15.4</a:t>
                       </a:r>
                     </a:p>
@@ -4585,7 +4857,7 @@
                     <a:p>
                       <a:pPr algn="ctr"/>
                       <a:r>
-                        <a:rPr lang="en-US" sz="1600" dirty="0"/>
+                        <a:rPr lang="en-US" sz="1200" dirty="0"/>
                         <a:t>2070000</a:t>
                       </a:r>
                     </a:p>
@@ -4663,7 +4935,7 @@
                         <a:defRPr/>
                       </a:pPr>
                       <a:r>
-                        <a:rPr lang="en-US" sz="1600" dirty="0"/>
+                        <a:rPr lang="en-US" sz="1200" dirty="0"/>
                         <a:t>21.7</a:t>
                       </a:r>
                     </a:p>
@@ -4724,7 +4996,7 @@
                   </a:ext>
                 </a:extLst>
               </a:tr>
-              <a:tr h="342900">
+              <a:tr h="265334">
                 <a:tc>
                   <a:txBody>
                     <a:bodyPr/>
@@ -4732,7 +5004,7 @@
                     <a:p>
                       <a:pPr algn="ctr"/>
                       <a:r>
-                        <a:rPr lang="en-US" sz="1600" b="1" kern="1200" dirty="0">
+                        <a:rPr lang="en-US" sz="1200" b="1" kern="1200" dirty="0">
                           <a:solidFill>
                             <a:schemeClr val="dk1"/>
                           </a:solidFill>
@@ -4740,7 +5012,7 @@
                         </a:rPr>
                         <a:t>1280x1024</a:t>
                       </a:r>
-                      <a:endParaRPr lang="en-US" sz="1600" b="1" dirty="0"/>
+                      <a:endParaRPr lang="en-US" sz="1200" b="1" dirty="0"/>
                     </a:p>
                   </a:txBody>
                   <a:tcPr marT="45721" marB="45721">
@@ -4800,7 +5072,7 @@
                     <a:p>
                       <a:pPr algn="ctr"/>
                       <a:r>
-                        <a:rPr lang="en-US" sz="1600" b="1" dirty="0"/>
+                        <a:rPr lang="en-US" sz="1200" b="1" dirty="0"/>
                         <a:t>60</a:t>
                       </a:r>
                     </a:p>
@@ -4815,6 +5087,68 @@
                       <a:headEnd type="none" w="med" len="med"/>
                       <a:tailEnd type="none" w="med" len="med"/>
                     </a:lnL>
+                    <a:lnR w="12700" cap="flat" cmpd="sng" algn="ctr">
+                      <a:solidFill>
+                        <a:srgbClr val="486B7B"/>
+                      </a:solidFill>
+                      <a:prstDash val="solid"/>
+                      <a:round/>
+                      <a:headEnd type="none" w="med" len="med"/>
+                      <a:tailEnd type="none" w="med" len="med"/>
+                    </a:lnR>
+                    <a:lnT w="12700" cap="flat" cmpd="sng" algn="ctr">
+                      <a:solidFill>
+                        <a:srgbClr val="486B7B"/>
+                      </a:solidFill>
+                      <a:prstDash val="solid"/>
+                      <a:round/>
+                      <a:headEnd type="none" w="med" len="med"/>
+                      <a:tailEnd type="none" w="med" len="med"/>
+                    </a:lnT>
+                    <a:lnB w="12700" cap="flat" cmpd="sng" algn="ctr">
+                      <a:solidFill>
+                        <a:srgbClr val="486B7B"/>
+                      </a:solidFill>
+                      <a:prstDash val="solid"/>
+                      <a:round/>
+                      <a:headEnd type="none" w="med" len="med"/>
+                      <a:tailEnd type="none" w="med" len="med"/>
+                    </a:lnB>
+                    <a:lnTlToBr w="12700" cmpd="sng">
+                      <a:noFill/>
+                      <a:prstDash val="solid"/>
+                    </a:lnTlToBr>
+                    <a:lnBlToTr w="12700" cmpd="sng">
+                      <a:noFill/>
+                      <a:prstDash val="solid"/>
+                    </a:lnBlToTr>
+                    <a:solidFill>
+                      <a:schemeClr val="bg1"/>
+                    </a:solidFill>
+                  </a:tcPr>
+                </a:tc>
+                <a:tc>
+                  <a:txBody>
+                    <a:bodyPr/>
+                    <a:lstStyle/>
+                    <a:p>
+                      <a:pPr algn="ctr"/>
+                      <a:r>
+                        <a:rPr lang="en-US" sz="1200" dirty="0"/>
+                        <a:t>27.2</a:t>
+                      </a:r>
+                    </a:p>
+                  </a:txBody>
+                  <a:tcPr marT="45721" marB="45721">
+                    <a:lnL w="12700" cap="flat" cmpd="sng" algn="ctr">
+                      <a:solidFill>
+                        <a:srgbClr val="486B7B"/>
+                      </a:solidFill>
+                      <a:prstDash val="solid"/>
+                      <a:round/>
+                      <a:headEnd type="none" w="med" len="med"/>
+                      <a:tailEnd type="none" w="med" len="med"/>
+                    </a:lnL>
                     <a:lnR w="38100" cap="flat" cmpd="sng" algn="ctr">
                       <a:solidFill>
                         <a:srgbClr val="486B7B"/>
@@ -4862,7 +5196,7 @@
                     <a:p>
                       <a:pPr algn="ctr"/>
                       <a:r>
-                        <a:rPr lang="en-US" sz="1600" dirty="0"/>
+                        <a:rPr lang="en-US" sz="1200" dirty="0"/>
                         <a:t>1515520</a:t>
                       </a:r>
                     </a:p>
@@ -4940,7 +5274,7 @@
                         <a:defRPr/>
                       </a:pPr>
                       <a:r>
-                        <a:rPr lang="en-US" sz="1600" dirty="0"/>
+                        <a:rPr lang="en-US" sz="1200" dirty="0"/>
                         <a:t>13.7</a:t>
                       </a:r>
                     </a:p>
@@ -5002,7 +5336,7 @@
                     <a:p>
                       <a:pPr algn="ctr"/>
                       <a:r>
-                        <a:rPr lang="en-US" sz="1600" dirty="0"/>
+                        <a:rPr lang="en-US" sz="1200" dirty="0"/>
                         <a:t>1413120</a:t>
                       </a:r>
                     </a:p>
@@ -5080,7 +5414,7 @@
                         <a:defRPr/>
                       </a:pPr>
                       <a:r>
-                        <a:rPr lang="en-US" sz="1600" dirty="0"/>
+                        <a:rPr lang="en-US" sz="1200" dirty="0"/>
                         <a:t>20.0</a:t>
                       </a:r>
                     </a:p>
@@ -5141,7 +5475,7 @@
                   </a:ext>
                 </a:extLst>
               </a:tr>
-              <a:tr h="342900">
+              <a:tr h="265334">
                 <a:tc>
                   <a:txBody>
                     <a:bodyPr/>
@@ -5149,7 +5483,7 @@
                     <a:p>
                       <a:pPr algn="ctr"/>
                       <a:r>
-                        <a:rPr lang="en-US" sz="1600" b="1" kern="1200" dirty="0">
+                        <a:rPr lang="en-US" sz="1200" b="1" kern="1200" dirty="0">
                           <a:solidFill>
                             <a:schemeClr val="dk1"/>
                           </a:solidFill>
@@ -5157,7 +5491,7 @@
                         </a:rPr>
                         <a:t>1280x960</a:t>
                       </a:r>
-                      <a:endParaRPr lang="en-US" sz="1600" b="1" dirty="0"/>
+                      <a:endParaRPr lang="en-US" sz="1200" b="1" dirty="0"/>
                     </a:p>
                   </a:txBody>
                   <a:tcPr marT="45721" marB="45721">
@@ -5217,7 +5551,7 @@
                     <a:p>
                       <a:pPr algn="ctr"/>
                       <a:r>
-                        <a:rPr lang="en-US" sz="1600" b="1" dirty="0"/>
+                        <a:rPr lang="en-US" sz="1200" b="1" dirty="0"/>
                         <a:t>60</a:t>
                       </a:r>
                     </a:p>
@@ -5232,6 +5566,68 @@
                       <a:headEnd type="none" w="med" len="med"/>
                       <a:tailEnd type="none" w="med" len="med"/>
                     </a:lnL>
+                    <a:lnR w="12700" cap="flat" cmpd="sng" algn="ctr">
+                      <a:solidFill>
+                        <a:srgbClr val="486B7B"/>
+                      </a:solidFill>
+                      <a:prstDash val="solid"/>
+                      <a:round/>
+                      <a:headEnd type="none" w="med" len="med"/>
+                      <a:tailEnd type="none" w="med" len="med"/>
+                    </a:lnR>
+                    <a:lnT w="12700" cap="flat" cmpd="sng" algn="ctr">
+                      <a:solidFill>
+                        <a:srgbClr val="486B7B"/>
+                      </a:solidFill>
+                      <a:prstDash val="solid"/>
+                      <a:round/>
+                      <a:headEnd type="none" w="med" len="med"/>
+                      <a:tailEnd type="none" w="med" len="med"/>
+                    </a:lnT>
+                    <a:lnB w="12700" cap="flat" cmpd="sng" algn="ctr">
+                      <a:solidFill>
+                        <a:srgbClr val="486B7B"/>
+                      </a:solidFill>
+                      <a:prstDash val="solid"/>
+                      <a:round/>
+                      <a:headEnd type="none" w="med" len="med"/>
+                      <a:tailEnd type="none" w="med" len="med"/>
+                    </a:lnB>
+                    <a:lnTlToBr w="12700" cmpd="sng">
+                      <a:noFill/>
+                      <a:prstDash val="solid"/>
+                    </a:lnTlToBr>
+                    <a:lnBlToTr w="12700" cmpd="sng">
+                      <a:noFill/>
+                      <a:prstDash val="solid"/>
+                    </a:lnBlToTr>
+                    <a:solidFill>
+                      <a:schemeClr val="bg1"/>
+                    </a:solidFill>
+                  </a:tcPr>
+                </a:tc>
+                <a:tc>
+                  <a:txBody>
+                    <a:bodyPr/>
+                    <a:lstStyle/>
+                    <a:p>
+                      <a:pPr algn="ctr"/>
+                      <a:r>
+                        <a:rPr lang="en-US" sz="1200" dirty="0"/>
+                        <a:t>31.7</a:t>
+                      </a:r>
+                    </a:p>
+                  </a:txBody>
+                  <a:tcPr marT="45721" marB="45721">
+                    <a:lnL w="12700" cap="flat" cmpd="sng" algn="ctr">
+                      <a:solidFill>
+                        <a:srgbClr val="486B7B"/>
+                      </a:solidFill>
+                      <a:prstDash val="solid"/>
+                      <a:round/>
+                      <a:headEnd type="none" w="med" len="med"/>
+                      <a:tailEnd type="none" w="med" len="med"/>
+                    </a:lnL>
                     <a:lnR w="38100" cap="flat" cmpd="sng" algn="ctr">
                       <a:solidFill>
                         <a:srgbClr val="486B7B"/>
@@ -5279,7 +5675,7 @@
                     <a:p>
                       <a:pPr algn="ctr"/>
                       <a:r>
-                        <a:rPr lang="en-US" sz="1600" dirty="0"/>
+                        <a:rPr lang="en-US" sz="1200" dirty="0"/>
                         <a:t>1420800</a:t>
                       </a:r>
                     </a:p>
@@ -5312,7 +5708,7 @@
                       <a:headEnd type="none" w="med" len="med"/>
                       <a:tailEnd type="none" w="med" len="med"/>
                     </a:lnT>
-                    <a:lnB w="19050" cap="flat" cmpd="sng" algn="ctr">
+                    <a:lnB w="12700" cap="flat" cmpd="sng" algn="ctr">
                       <a:solidFill>
                         <a:srgbClr val="486B7B"/>
                       </a:solidFill>
@@ -5341,7 +5737,7 @@
                     <a:p>
                       <a:pPr algn="ctr"/>
                       <a:r>
-                        <a:rPr lang="en-US" sz="1600" dirty="0"/>
+                        <a:rPr lang="en-US" sz="1200" dirty="0"/>
                         <a:t>18.2</a:t>
                       </a:r>
                     </a:p>
@@ -5403,7 +5799,7 @@
                     <a:p>
                       <a:pPr algn="ctr"/>
                       <a:r>
-                        <a:rPr lang="en-US" sz="1600" dirty="0"/>
+                        <a:rPr lang="en-US" sz="1200" dirty="0"/>
                         <a:t>1324800</a:t>
                       </a:r>
                     </a:p>
@@ -5465,7 +5861,7 @@
                     <a:p>
                       <a:pPr algn="ctr"/>
                       <a:r>
-                        <a:rPr lang="en-US" sz="1600" dirty="0"/>
+                        <a:rPr lang="en-US" sz="1200" dirty="0"/>
                         <a:t>24.5</a:t>
                       </a:r>
                     </a:p>
@@ -5526,7 +5922,7 @@
                   </a:ext>
                 </a:extLst>
               </a:tr>
-              <a:tr h="342900">
+              <a:tr h="265334">
                 <a:tc>
                   <a:txBody>
                     <a:bodyPr/>
@@ -5534,7 +5930,7 @@
                     <a:p>
                       <a:pPr algn="ctr"/>
                       <a:r>
-                        <a:rPr lang="en-US" sz="1600" b="1" kern="1200" dirty="0">
+                        <a:rPr lang="en-US" sz="1200" b="1" kern="1200" dirty="0">
                           <a:solidFill>
                             <a:schemeClr val="dk1"/>
                           </a:solidFill>
@@ -5542,7 +5938,7 @@
                         </a:rPr>
                         <a:t>1280x800</a:t>
                       </a:r>
-                      <a:endParaRPr lang="en-US" sz="1600" b="1" dirty="0"/>
+                      <a:endParaRPr lang="en-US" sz="1200" b="1" dirty="0"/>
                     </a:p>
                   </a:txBody>
                   <a:tcPr marT="45721" marB="45721">
@@ -5602,7 +5998,7 @@
                     <a:p>
                       <a:pPr algn="ctr"/>
                       <a:r>
-                        <a:rPr lang="en-US" sz="1600" b="1" dirty="0"/>
+                        <a:rPr lang="en-US" sz="1200" b="1" dirty="0"/>
                         <a:t>60</a:t>
                       </a:r>
                     </a:p>
@@ -5617,6 +6013,68 @@
                       <a:headEnd type="none" w="med" len="med"/>
                       <a:tailEnd type="none" w="med" len="med"/>
                     </a:lnL>
+                    <a:lnR w="12700" cap="flat" cmpd="sng" algn="ctr">
+                      <a:solidFill>
+                        <a:srgbClr val="486B7B"/>
+                      </a:solidFill>
+                      <a:prstDash val="solid"/>
+                      <a:round/>
+                      <a:headEnd type="none" w="med" len="med"/>
+                      <a:tailEnd type="none" w="med" len="med"/>
+                    </a:lnR>
+                    <a:lnT w="12700" cap="flat" cmpd="sng" algn="ctr">
+                      <a:solidFill>
+                        <a:srgbClr val="486B7B"/>
+                      </a:solidFill>
+                      <a:prstDash val="solid"/>
+                      <a:round/>
+                      <a:headEnd type="none" w="med" len="med"/>
+                      <a:tailEnd type="none" w="med" len="med"/>
+                    </a:lnT>
+                    <a:lnB w="12700" cap="flat" cmpd="sng" algn="ctr">
+                      <a:solidFill>
+                        <a:srgbClr val="486B7B"/>
+                      </a:solidFill>
+                      <a:prstDash val="solid"/>
+                      <a:round/>
+                      <a:headEnd type="none" w="med" len="med"/>
+                      <a:tailEnd type="none" w="med" len="med"/>
+                    </a:lnB>
+                    <a:lnTlToBr w="12700" cmpd="sng">
+                      <a:noFill/>
+                      <a:prstDash val="solid"/>
+                    </a:lnTlToBr>
+                    <a:lnBlToTr w="12700" cmpd="sng">
+                      <a:noFill/>
+                      <a:prstDash val="solid"/>
+                    </a:lnBlToTr>
+                    <a:solidFill>
+                      <a:schemeClr val="bg1"/>
+                    </a:solidFill>
+                  </a:tcPr>
+                </a:tc>
+                <a:tc>
+                  <a:txBody>
+                    <a:bodyPr/>
+                    <a:lstStyle/>
+                    <a:p>
+                      <a:pPr algn="ctr"/>
+                      <a:r>
+                        <a:rPr lang="en-US" sz="1200" dirty="0"/>
+                        <a:t>26.4</a:t>
+                      </a:r>
+                    </a:p>
+                  </a:txBody>
+                  <a:tcPr marT="45721" marB="45721">
+                    <a:lnL w="12700" cap="flat" cmpd="sng" algn="ctr">
+                      <a:solidFill>
+                        <a:srgbClr val="486B7B"/>
+                      </a:solidFill>
+                      <a:prstDash val="solid"/>
+                      <a:round/>
+                      <a:headEnd type="none" w="med" len="med"/>
+                      <a:tailEnd type="none" w="med" len="med"/>
+                    </a:lnL>
                     <a:lnR w="38100" cap="flat" cmpd="sng" algn="ctr">
                       <a:solidFill>
                         <a:srgbClr val="486B7B"/>
@@ -5664,7 +6122,7 @@
                     <a:p>
                       <a:pPr algn="ctr"/>
                       <a:r>
-                        <a:rPr lang="en-US" sz="1600" dirty="0"/>
+                        <a:rPr lang="en-US" sz="1200" dirty="0"/>
                         <a:t>1184000</a:t>
                       </a:r>
                     </a:p>
@@ -5688,7 +6146,7 @@
                       <a:headEnd type="none" w="med" len="med"/>
                       <a:tailEnd type="none" w="med" len="med"/>
                     </a:lnR>
-                    <a:lnT w="19050" cap="flat" cmpd="sng" algn="ctr">
+                    <a:lnT w="12700" cap="flat" cmpd="sng" algn="ctr">
                       <a:solidFill>
                         <a:srgbClr val="486B7B"/>
                       </a:solidFill>
@@ -5742,7 +6200,7 @@
                         <a:defRPr/>
                       </a:pPr>
                       <a:r>
-                        <a:rPr lang="en-US" sz="1600" dirty="0"/>
+                        <a:rPr lang="en-US" sz="1200" dirty="0"/>
                         <a:t>12.9</a:t>
                       </a:r>
                     </a:p>
@@ -5804,7 +6262,7 @@
                     <a:p>
                       <a:pPr algn="ctr"/>
                       <a:r>
-                        <a:rPr lang="en-US" sz="1600" dirty="0"/>
+                        <a:rPr lang="en-US" sz="1200" dirty="0"/>
                         <a:t>1104000</a:t>
                       </a:r>
                     </a:p>
@@ -5882,7 +6340,7 @@
                         <a:defRPr/>
                       </a:pPr>
                       <a:r>
-                        <a:rPr lang="en-US" sz="1600" dirty="0"/>
+                        <a:rPr lang="en-US" sz="1200" dirty="0"/>
                         <a:t>19.2</a:t>
                       </a:r>
                     </a:p>
@@ -5943,7 +6401,7 @@
                   </a:ext>
                 </a:extLst>
               </a:tr>
-              <a:tr h="342900">
+              <a:tr h="265334">
                 <a:tc>
                   <a:txBody>
                     <a:bodyPr/>
@@ -5951,7 +6409,7 @@
                     <a:p>
                       <a:pPr algn="ctr"/>
                       <a:r>
-                        <a:rPr lang="en-US" sz="1600" b="1" kern="1200" dirty="0">
+                        <a:rPr lang="en-US" sz="1200" b="1" kern="1200" dirty="0">
                           <a:solidFill>
                             <a:schemeClr val="dk1"/>
                           </a:solidFill>
@@ -5959,7 +6417,7 @@
                         </a:rPr>
                         <a:t>1024x768</a:t>
                       </a:r>
-                      <a:endParaRPr lang="en-US" sz="1600" b="1" dirty="0"/>
+                      <a:endParaRPr lang="en-US" sz="1200" b="1" dirty="0"/>
                     </a:p>
                   </a:txBody>
                   <a:tcPr marT="45721" marB="45721">
@@ -6019,7 +6477,7 @@
                     <a:p>
                       <a:pPr algn="ctr"/>
                       <a:r>
-                        <a:rPr lang="en-US" sz="1600" b="1" dirty="0"/>
+                        <a:rPr lang="en-US" sz="1200" b="1" dirty="0"/>
                         <a:t>60</a:t>
                       </a:r>
                     </a:p>
@@ -6034,6 +6492,68 @@
                       <a:headEnd type="none" w="med" len="med"/>
                       <a:tailEnd type="none" w="med" len="med"/>
                     </a:lnL>
+                    <a:lnR w="12700" cap="flat" cmpd="sng" algn="ctr">
+                      <a:solidFill>
+                        <a:srgbClr val="486B7B"/>
+                      </a:solidFill>
+                      <a:prstDash val="solid"/>
+                      <a:round/>
+                      <a:headEnd type="none" w="med" len="med"/>
+                      <a:tailEnd type="none" w="med" len="med"/>
+                    </a:lnR>
+                    <a:lnT w="12700" cap="flat" cmpd="sng" algn="ctr">
+                      <a:solidFill>
+                        <a:srgbClr val="486B7B"/>
+                      </a:solidFill>
+                      <a:prstDash val="solid"/>
+                      <a:round/>
+                      <a:headEnd type="none" w="med" len="med"/>
+                      <a:tailEnd type="none" w="med" len="med"/>
+                    </a:lnT>
+                    <a:lnB w="12700" cap="flat" cmpd="sng" algn="ctr">
+                      <a:solidFill>
+                        <a:srgbClr val="486B7B"/>
+                      </a:solidFill>
+                      <a:prstDash val="solid"/>
+                      <a:round/>
+                      <a:headEnd type="none" w="med" len="med"/>
+                      <a:tailEnd type="none" w="med" len="med"/>
+                    </a:lnB>
+                    <a:lnTlToBr w="12700" cmpd="sng">
+                      <a:noFill/>
+                      <a:prstDash val="solid"/>
+                    </a:lnTlToBr>
+                    <a:lnBlToTr w="12700" cmpd="sng">
+                      <a:noFill/>
+                      <a:prstDash val="solid"/>
+                    </a:lnBlToTr>
+                    <a:solidFill>
+                      <a:schemeClr val="bg1"/>
+                    </a:solidFill>
+                  </a:tcPr>
+                </a:tc>
+                <a:tc>
+                  <a:txBody>
+                    <a:bodyPr/>
+                    <a:lstStyle/>
+                    <a:p>
+                      <a:pPr algn="ctr"/>
+                      <a:r>
+                        <a:rPr lang="en-US" sz="1200" dirty="0"/>
+                        <a:t>27.4</a:t>
+                      </a:r>
+                    </a:p>
+                  </a:txBody>
+                  <a:tcPr marT="45721" marB="45721">
+                    <a:lnL w="12700" cap="flat" cmpd="sng" algn="ctr">
+                      <a:solidFill>
+                        <a:srgbClr val="486B7B"/>
+                      </a:solidFill>
+                      <a:prstDash val="solid"/>
+                      <a:round/>
+                      <a:headEnd type="none" w="med" len="med"/>
+                      <a:tailEnd type="none" w="med" len="med"/>
+                    </a:lnL>
                     <a:lnR w="38100" cap="flat" cmpd="sng" algn="ctr">
                       <a:solidFill>
                         <a:srgbClr val="486B7B"/>
@@ -6081,7 +6601,7 @@
                     <a:p>
                       <a:pPr algn="ctr"/>
                       <a:r>
-                        <a:rPr lang="en-US" sz="1600" dirty="0"/>
+                        <a:rPr lang="en-US" sz="1200" dirty="0"/>
                         <a:t>909312</a:t>
                       </a:r>
                     </a:p>
@@ -6159,7 +6679,7 @@
                         <a:defRPr/>
                       </a:pPr>
                       <a:r>
-                        <a:rPr lang="en-US" sz="1600" dirty="0"/>
+                        <a:rPr lang="en-US" sz="1200" dirty="0"/>
                         <a:t>13.9</a:t>
                       </a:r>
                     </a:p>
@@ -6221,7 +6741,7 @@
                     <a:p>
                       <a:pPr algn="ctr"/>
                       <a:r>
-                        <a:rPr lang="en-US" sz="1600" dirty="0"/>
+                        <a:rPr lang="en-US" sz="1200" dirty="0"/>
                         <a:t>847872</a:t>
                       </a:r>
                     </a:p>
@@ -6299,7 +6819,7 @@
                         <a:defRPr/>
                       </a:pPr>
                       <a:r>
-                        <a:rPr lang="en-US" sz="1600" dirty="0"/>
+                        <a:rPr lang="en-US" sz="1200" dirty="0"/>
                         <a:t>20.2</a:t>
                       </a:r>
                     </a:p>
@@ -6360,7 +6880,7 @@
                   </a:ext>
                 </a:extLst>
               </a:tr>
-              <a:tr h="342900">
+              <a:tr h="265334">
                 <a:tc>
                   <a:txBody>
                     <a:bodyPr/>
@@ -6368,7 +6888,7 @@
                     <a:p>
                       <a:pPr algn="ctr"/>
                       <a:r>
-                        <a:rPr lang="en-US" sz="1600" b="1" kern="1200" dirty="0">
+                        <a:rPr lang="en-US" sz="1200" b="1" kern="1200" dirty="0">
                           <a:solidFill>
                             <a:schemeClr val="dk1"/>
                           </a:solidFill>
@@ -6376,7 +6896,7 @@
                         </a:rPr>
                         <a:t>512x512</a:t>
                       </a:r>
-                      <a:endParaRPr lang="en-US" sz="1600" b="1" dirty="0"/>
+                      <a:endParaRPr lang="en-US" sz="1200" b="1" dirty="0"/>
                     </a:p>
                   </a:txBody>
                   <a:tcPr marT="45721" marB="45721">
@@ -6436,7 +6956,7 @@
                     <a:p>
                       <a:pPr algn="ctr"/>
                       <a:r>
-                        <a:rPr lang="en-US" sz="1600" b="1" dirty="0"/>
+                        <a:rPr lang="en-US" sz="1200" b="1" dirty="0"/>
                         <a:t>500</a:t>
                       </a:r>
                     </a:p>
@@ -6451,6 +6971,68 @@
                       <a:headEnd type="none" w="med" len="med"/>
                       <a:tailEnd type="none" w="med" len="med"/>
                     </a:lnL>
+                    <a:lnR w="12700" cap="flat" cmpd="sng" algn="ctr">
+                      <a:solidFill>
+                        <a:srgbClr val="486B7B"/>
+                      </a:solidFill>
+                      <a:prstDash val="solid"/>
+                      <a:round/>
+                      <a:headEnd type="none" w="med" len="med"/>
+                      <a:tailEnd type="none" w="med" len="med"/>
+                    </a:lnR>
+                    <a:lnT w="12700" cap="flat" cmpd="sng" algn="ctr">
+                      <a:solidFill>
+                        <a:srgbClr val="486B7B"/>
+                      </a:solidFill>
+                      <a:prstDash val="solid"/>
+                      <a:round/>
+                      <a:headEnd type="none" w="med" len="med"/>
+                      <a:tailEnd type="none" w="med" len="med"/>
+                    </a:lnT>
+                    <a:lnB w="12700" cap="flat" cmpd="sng" algn="ctr">
+                      <a:solidFill>
+                        <a:srgbClr val="486B7B"/>
+                      </a:solidFill>
+                      <a:prstDash val="solid"/>
+                      <a:round/>
+                      <a:headEnd type="none" w="med" len="med"/>
+                      <a:tailEnd type="none" w="med" len="med"/>
+                    </a:lnB>
+                    <a:lnTlToBr w="12700" cmpd="sng">
+                      <a:noFill/>
+                      <a:prstDash val="solid"/>
+                    </a:lnTlToBr>
+                    <a:lnBlToTr w="12700" cmpd="sng">
+                      <a:noFill/>
+                      <a:prstDash val="solid"/>
+                    </a:lnBlToTr>
+                    <a:solidFill>
+                      <a:schemeClr val="bg1"/>
+                    </a:solidFill>
+                  </a:tcPr>
+                </a:tc>
+                <a:tc>
+                  <a:txBody>
+                    <a:bodyPr/>
+                    <a:lstStyle/>
+                    <a:p>
+                      <a:pPr algn="ctr"/>
+                      <a:r>
+                        <a:rPr lang="en-US" sz="1200" dirty="0"/>
+                        <a:t>11.5</a:t>
+                      </a:r>
+                    </a:p>
+                  </a:txBody>
+                  <a:tcPr marT="45721" marB="45721">
+                    <a:lnL w="12700" cap="flat" cmpd="sng" algn="ctr">
+                      <a:solidFill>
+                        <a:srgbClr val="486B7B"/>
+                      </a:solidFill>
+                      <a:prstDash val="solid"/>
+                      <a:round/>
+                      <a:headEnd type="none" w="med" len="med"/>
+                      <a:tailEnd type="none" w="med" len="med"/>
+                    </a:lnL>
                     <a:lnR w="38100" cap="flat" cmpd="sng" algn="ctr">
                       <a:solidFill>
                         <a:srgbClr val="486B7B"/>
@@ -6498,7 +7080,7 @@
                     <a:p>
                       <a:pPr algn="ctr"/>
                       <a:r>
-                        <a:rPr lang="en-US" sz="1600" dirty="0"/>
+                        <a:rPr lang="en-US" sz="1200" dirty="0"/>
                         <a:t>303104</a:t>
                       </a:r>
                     </a:p>
@@ -6560,7 +7142,7 @@
                     <a:p>
                       <a:pPr algn="ctr"/>
                       <a:r>
-                        <a:rPr lang="en-US" sz="1600" dirty="0"/>
+                        <a:rPr lang="en-US" sz="1200" dirty="0"/>
                         <a:t>-2.0</a:t>
                       </a:r>
                     </a:p>
@@ -6622,7 +7204,7 @@
                     <a:p>
                       <a:pPr algn="ctr"/>
                       <a:r>
-                        <a:rPr lang="en-US" sz="1600" dirty="0"/>
+                        <a:rPr lang="en-US" sz="1200" dirty="0"/>
                         <a:t>282624</a:t>
                       </a:r>
                     </a:p>
@@ -6684,7 +7266,7 @@
                     <a:p>
                       <a:pPr algn="ctr"/>
                       <a:r>
-                        <a:rPr lang="en-US" sz="1600" dirty="0"/>
+                        <a:rPr lang="en-US" sz="1200" dirty="0"/>
                         <a:t>4.3</a:t>
                       </a:r>
                     </a:p>
@@ -6745,7 +7327,7 @@
                   </a:ext>
                 </a:extLst>
               </a:tr>
-              <a:tr h="342900">
+              <a:tr h="265334">
                 <a:tc>
                   <a:txBody>
                     <a:bodyPr/>
@@ -6753,7 +7335,7 @@
                     <a:p>
                       <a:pPr algn="ctr"/>
                       <a:r>
-                        <a:rPr lang="en-US" sz="1600" b="1" kern="1200" dirty="0">
+                        <a:rPr lang="en-US" sz="1200" b="1" kern="1200" dirty="0">
                           <a:solidFill>
                             <a:schemeClr val="dk1"/>
                           </a:solidFill>
@@ -6761,7 +7343,7 @@
                         </a:rPr>
                         <a:t>512x512</a:t>
                       </a:r>
-                      <a:endParaRPr lang="en-US" sz="1600" b="1" dirty="0"/>
+                      <a:endParaRPr lang="en-US" sz="1200" b="1" dirty="0"/>
                     </a:p>
                   </a:txBody>
                   <a:tcPr marT="45721" marB="45721">
@@ -6821,7 +7403,7 @@
                     <a:p>
                       <a:pPr algn="ctr"/>
                       <a:r>
-                        <a:rPr lang="en-US" sz="1600" b="1" dirty="0"/>
+                        <a:rPr lang="en-US" sz="1200" b="1" dirty="0"/>
                         <a:t>400</a:t>
                       </a:r>
                     </a:p>
@@ -6836,6 +7418,68 @@
                       <a:headEnd type="none" w="med" len="med"/>
                       <a:tailEnd type="none" w="med" len="med"/>
                     </a:lnL>
+                    <a:lnR w="12700" cap="flat" cmpd="sng" algn="ctr">
+                      <a:solidFill>
+                        <a:srgbClr val="486B7B"/>
+                      </a:solidFill>
+                      <a:prstDash val="solid"/>
+                      <a:round/>
+                      <a:headEnd type="none" w="med" len="med"/>
+                      <a:tailEnd type="none" w="med" len="med"/>
+                    </a:lnR>
+                    <a:lnT w="12700" cap="flat" cmpd="sng" algn="ctr">
+                      <a:solidFill>
+                        <a:srgbClr val="486B7B"/>
+                      </a:solidFill>
+                      <a:prstDash val="solid"/>
+                      <a:round/>
+                      <a:headEnd type="none" w="med" len="med"/>
+                      <a:tailEnd type="none" w="med" len="med"/>
+                    </a:lnT>
+                    <a:lnB w="12700" cap="flat" cmpd="sng" algn="ctr">
+                      <a:solidFill>
+                        <a:srgbClr val="486B7B"/>
+                      </a:solidFill>
+                      <a:prstDash val="solid"/>
+                      <a:round/>
+                      <a:headEnd type="none" w="med" len="med"/>
+                      <a:tailEnd type="none" w="med" len="med"/>
+                    </a:lnB>
+                    <a:lnTlToBr w="12700" cmpd="sng">
+                      <a:noFill/>
+                      <a:prstDash val="solid"/>
+                    </a:lnTlToBr>
+                    <a:lnBlToTr w="12700" cmpd="sng">
+                      <a:noFill/>
+                      <a:prstDash val="solid"/>
+                    </a:lnBlToTr>
+                    <a:solidFill>
+                      <a:schemeClr val="bg1"/>
+                    </a:solidFill>
+                  </a:tcPr>
+                </a:tc>
+                <a:tc>
+                  <a:txBody>
+                    <a:bodyPr/>
+                    <a:lstStyle/>
+                    <a:p>
+                      <a:pPr algn="ctr"/>
+                      <a:r>
+                        <a:rPr lang="en-US" sz="1200" dirty="0"/>
+                        <a:t>11.5</a:t>
+                      </a:r>
+                    </a:p>
+                  </a:txBody>
+                  <a:tcPr marT="45721" marB="45721">
+                    <a:lnL w="12700" cap="flat" cmpd="sng" algn="ctr">
+                      <a:solidFill>
+                        <a:srgbClr val="486B7B"/>
+                      </a:solidFill>
+                      <a:prstDash val="solid"/>
+                      <a:round/>
+                      <a:headEnd type="none" w="med" len="med"/>
+                      <a:tailEnd type="none" w="med" len="med"/>
+                    </a:lnL>
                     <a:lnR w="38100" cap="flat" cmpd="sng" algn="ctr">
                       <a:solidFill>
                         <a:srgbClr val="486B7B"/>
@@ -6883,7 +7527,7 @@
                     <a:p>
                       <a:pPr algn="ctr"/>
                       <a:r>
-                        <a:rPr lang="en-US" sz="1600" dirty="0"/>
+                        <a:rPr lang="en-US" sz="1200" dirty="0"/>
                         <a:t>303104</a:t>
                       </a:r>
                     </a:p>
@@ -6961,7 +7605,7 @@
                         <a:defRPr/>
                       </a:pPr>
                       <a:r>
-                        <a:rPr lang="en-US" sz="1600" dirty="0"/>
+                        <a:rPr lang="en-US" sz="1200" dirty="0"/>
                         <a:t>-2.0</a:t>
                       </a:r>
                     </a:p>
@@ -7023,7 +7667,7 @@
                     <a:p>
                       <a:pPr algn="ctr"/>
                       <a:r>
-                        <a:rPr lang="en-US" sz="1600" dirty="0"/>
+                        <a:rPr lang="en-US" sz="1200" dirty="0"/>
                         <a:t>282624</a:t>
                       </a:r>
                     </a:p>
@@ -7101,7 +7745,7 @@
                         <a:defRPr/>
                       </a:pPr>
                       <a:r>
-                        <a:rPr lang="en-US" sz="1600" dirty="0"/>
+                        <a:rPr lang="en-US" sz="1200" dirty="0"/>
                         <a:t>4.3</a:t>
                       </a:r>
                     </a:p>
@@ -7162,7 +7806,7 @@
                   </a:ext>
                 </a:extLst>
               </a:tr>
-              <a:tr h="342900">
+              <a:tr h="265334">
                 <a:tc>
                   <a:txBody>
                     <a:bodyPr/>
@@ -7170,7 +7814,7 @@
                     <a:p>
                       <a:pPr algn="ctr"/>
                       <a:r>
-                        <a:rPr lang="en-US" sz="1600" b="1" kern="1200" dirty="0">
+                        <a:rPr lang="en-US" sz="1200" b="1" kern="1200" dirty="0">
                           <a:solidFill>
                             <a:schemeClr val="dk1"/>
                           </a:solidFill>
@@ -7178,7 +7822,7 @@
                         </a:rPr>
                         <a:t>512x512</a:t>
                       </a:r>
-                      <a:endParaRPr lang="en-US" sz="1600" b="1" dirty="0"/>
+                      <a:endParaRPr lang="en-US" sz="1200" b="1" dirty="0"/>
                     </a:p>
                   </a:txBody>
                   <a:tcPr marT="45721" marB="45721">
@@ -7238,7 +7882,7 @@
                     <a:p>
                       <a:pPr algn="ctr"/>
                       <a:r>
-                        <a:rPr lang="en-US" sz="1600" b="1" dirty="0"/>
+                        <a:rPr lang="en-US" sz="1200" b="1" dirty="0"/>
                         <a:t>300</a:t>
                       </a:r>
                     </a:p>
@@ -7253,6 +7897,68 @@
                       <a:headEnd type="none" w="med" len="med"/>
                       <a:tailEnd type="none" w="med" len="med"/>
                     </a:lnL>
+                    <a:lnR w="12700" cap="flat" cmpd="sng" algn="ctr">
+                      <a:solidFill>
+                        <a:srgbClr val="486B7B"/>
+                      </a:solidFill>
+                      <a:prstDash val="solid"/>
+                      <a:round/>
+                      <a:headEnd type="none" w="med" len="med"/>
+                      <a:tailEnd type="none" w="med" len="med"/>
+                    </a:lnR>
+                    <a:lnT w="12700" cap="flat" cmpd="sng" algn="ctr">
+                      <a:solidFill>
+                        <a:srgbClr val="486B7B"/>
+                      </a:solidFill>
+                      <a:prstDash val="solid"/>
+                      <a:round/>
+                      <a:headEnd type="none" w="med" len="med"/>
+                      <a:tailEnd type="none" w="med" len="med"/>
+                    </a:lnT>
+                    <a:lnB w="12700" cap="flat" cmpd="sng" algn="ctr">
+                      <a:solidFill>
+                        <a:srgbClr val="486B7B"/>
+                      </a:solidFill>
+                      <a:prstDash val="solid"/>
+                      <a:round/>
+                      <a:headEnd type="none" w="med" len="med"/>
+                      <a:tailEnd type="none" w="med" len="med"/>
+                    </a:lnB>
+                    <a:lnTlToBr w="12700" cmpd="sng">
+                      <a:noFill/>
+                      <a:prstDash val="solid"/>
+                    </a:lnTlToBr>
+                    <a:lnBlToTr w="12700" cmpd="sng">
+                      <a:noFill/>
+                      <a:prstDash val="solid"/>
+                    </a:lnBlToTr>
+                    <a:solidFill>
+                      <a:schemeClr val="bg1"/>
+                    </a:solidFill>
+                  </a:tcPr>
+                </a:tc>
+                <a:tc>
+                  <a:txBody>
+                    <a:bodyPr/>
+                    <a:lstStyle/>
+                    <a:p>
+                      <a:pPr algn="ctr"/>
+                      <a:r>
+                        <a:rPr lang="en-US" sz="1200" dirty="0"/>
+                        <a:t>26.7</a:t>
+                      </a:r>
+                    </a:p>
+                  </a:txBody>
+                  <a:tcPr marT="45721" marB="45721">
+                    <a:lnL w="12700" cap="flat" cmpd="sng" algn="ctr">
+                      <a:solidFill>
+                        <a:srgbClr val="486B7B"/>
+                      </a:solidFill>
+                      <a:prstDash val="solid"/>
+                      <a:round/>
+                      <a:headEnd type="none" w="med" len="med"/>
+                      <a:tailEnd type="none" w="med" len="med"/>
+                    </a:lnL>
                     <a:lnR w="38100" cap="flat" cmpd="sng" algn="ctr">
                       <a:solidFill>
                         <a:srgbClr val="486B7B"/>
@@ -7300,7 +8006,7 @@
                     <a:p>
                       <a:pPr algn="ctr"/>
                       <a:r>
-                        <a:rPr lang="en-US" sz="1600" dirty="0"/>
+                        <a:rPr lang="en-US" sz="1200" dirty="0"/>
                         <a:t>303104</a:t>
                       </a:r>
                     </a:p>
@@ -7378,7 +8084,7 @@
                         <a:defRPr/>
                       </a:pPr>
                       <a:r>
-                        <a:rPr lang="en-US" sz="1600" dirty="0"/>
+                        <a:rPr lang="en-US" sz="1200" dirty="0"/>
                         <a:t>13.2</a:t>
                       </a:r>
                     </a:p>
@@ -7440,7 +8146,7 @@
                     <a:p>
                       <a:pPr algn="ctr"/>
                       <a:r>
-                        <a:rPr lang="en-US" sz="1600" dirty="0"/>
+                        <a:rPr lang="en-US" sz="1200" dirty="0"/>
                         <a:t>282624</a:t>
                       </a:r>
                     </a:p>
@@ -7518,7 +8224,7 @@
                         <a:defRPr/>
                       </a:pPr>
                       <a:r>
-                        <a:rPr lang="en-US" sz="1600" dirty="0"/>
+                        <a:rPr lang="en-US" sz="1200" dirty="0"/>
                         <a:t>19.5</a:t>
                       </a:r>
                     </a:p>
@@ -7579,7 +8285,7 @@
                   </a:ext>
                 </a:extLst>
               </a:tr>
-              <a:tr h="342900">
+              <a:tr h="265334">
                 <a:tc>
                   <a:txBody>
                     <a:bodyPr/>
@@ -7587,7 +8293,7 @@
                     <a:p>
                       <a:pPr algn="ctr"/>
                       <a:r>
-                        <a:rPr lang="en-US" sz="1600" b="1" kern="1200" dirty="0">
+                        <a:rPr lang="en-US" sz="1200" b="1" kern="1200" dirty="0">
                           <a:solidFill>
                             <a:schemeClr val="dk1"/>
                           </a:solidFill>
@@ -7595,7 +8301,7 @@
                         </a:rPr>
                         <a:t>512x512</a:t>
                       </a:r>
-                      <a:endParaRPr lang="en-US" sz="1600" b="1" dirty="0"/>
+                      <a:endParaRPr lang="en-US" sz="1200" b="1" dirty="0"/>
                     </a:p>
                   </a:txBody>
                   <a:tcPr marT="45721" marB="45721">
@@ -7655,7 +8361,7 @@
                     <a:p>
                       <a:pPr algn="ctr"/>
                       <a:r>
-                        <a:rPr lang="en-US" sz="1600" b="1" dirty="0"/>
+                        <a:rPr lang="en-US" sz="1200" b="1" dirty="0"/>
                         <a:t>100</a:t>
                       </a:r>
                     </a:p>
@@ -7670,6 +8376,68 @@
                       <a:headEnd type="none" w="med" len="med"/>
                       <a:tailEnd type="none" w="med" len="med"/>
                     </a:lnL>
+                    <a:lnR w="12700" cap="flat" cmpd="sng" algn="ctr">
+                      <a:solidFill>
+                        <a:srgbClr val="486B7B"/>
+                      </a:solidFill>
+                      <a:prstDash val="solid"/>
+                      <a:round/>
+                      <a:headEnd type="none" w="med" len="med"/>
+                      <a:tailEnd type="none" w="med" len="med"/>
+                    </a:lnR>
+                    <a:lnT w="12700" cap="flat" cmpd="sng" algn="ctr">
+                      <a:solidFill>
+                        <a:srgbClr val="486B7B"/>
+                      </a:solidFill>
+                      <a:prstDash val="solid"/>
+                      <a:round/>
+                      <a:headEnd type="none" w="med" len="med"/>
+                      <a:tailEnd type="none" w="med" len="med"/>
+                    </a:lnT>
+                    <a:lnB w="12700" cap="flat" cmpd="sng" algn="ctr">
+                      <a:solidFill>
+                        <a:srgbClr val="486B7B"/>
+                      </a:solidFill>
+                      <a:prstDash val="solid"/>
+                      <a:round/>
+                      <a:headEnd type="none" w="med" len="med"/>
+                      <a:tailEnd type="none" w="med" len="med"/>
+                    </a:lnB>
+                    <a:lnTlToBr w="12700" cmpd="sng">
+                      <a:noFill/>
+                      <a:prstDash val="solid"/>
+                    </a:lnTlToBr>
+                    <a:lnBlToTr w="12700" cmpd="sng">
+                      <a:noFill/>
+                      <a:prstDash val="solid"/>
+                    </a:lnBlToTr>
+                    <a:solidFill>
+                      <a:schemeClr val="bg1"/>
+                    </a:solidFill>
+                  </a:tcPr>
+                </a:tc>
+                <a:tc>
+                  <a:txBody>
+                    <a:bodyPr/>
+                    <a:lstStyle/>
+                    <a:p>
+                      <a:pPr algn="ctr"/>
+                      <a:r>
+                        <a:rPr lang="en-US" sz="1200" dirty="0"/>
+                        <a:t>26.7</a:t>
+                      </a:r>
+                    </a:p>
+                  </a:txBody>
+                  <a:tcPr marT="45721" marB="45721">
+                    <a:lnL w="12700" cap="flat" cmpd="sng" algn="ctr">
+                      <a:solidFill>
+                        <a:srgbClr val="486B7B"/>
+                      </a:solidFill>
+                      <a:prstDash val="solid"/>
+                      <a:round/>
+                      <a:headEnd type="none" w="med" len="med"/>
+                      <a:tailEnd type="none" w="med" len="med"/>
+                    </a:lnL>
                     <a:lnR w="38100" cap="flat" cmpd="sng" algn="ctr">
                       <a:solidFill>
                         <a:srgbClr val="486B7B"/>
@@ -7717,7 +8485,7 @@
                     <a:p>
                       <a:pPr algn="ctr"/>
                       <a:r>
-                        <a:rPr lang="en-US" sz="1600" dirty="0"/>
+                        <a:rPr lang="en-US" sz="1200" dirty="0"/>
                         <a:t>303104</a:t>
                       </a:r>
                     </a:p>
@@ -7795,7 +8563,7 @@
                         <a:defRPr/>
                       </a:pPr>
                       <a:r>
-                        <a:rPr lang="en-US" sz="1600" dirty="0"/>
+                        <a:rPr lang="en-US" sz="1200" dirty="0"/>
                         <a:t>13.2</a:t>
                       </a:r>
                     </a:p>
@@ -7857,7 +8625,7 @@
                     <a:p>
                       <a:pPr algn="ctr"/>
                       <a:r>
-                        <a:rPr lang="en-US" sz="1600" dirty="0"/>
+                        <a:rPr lang="en-US" sz="1200" dirty="0"/>
                         <a:t>282624</a:t>
                       </a:r>
                     </a:p>
@@ -7935,7 +8703,7 @@
                         <a:defRPr/>
                       </a:pPr>
                       <a:r>
-                        <a:rPr lang="en-US" sz="1600" dirty="0"/>
+                        <a:rPr lang="en-US" sz="1200" dirty="0"/>
                         <a:t>19.5</a:t>
                       </a:r>
                     </a:p>
@@ -7996,7 +8764,7 @@
                   </a:ext>
                 </a:extLst>
               </a:tr>
-              <a:tr h="342900">
+              <a:tr h="265334">
                 <a:tc>
                   <a:txBody>
                     <a:bodyPr/>
@@ -8004,7 +8772,7 @@
                     <a:p>
                       <a:pPr algn="ctr"/>
                       <a:r>
-                        <a:rPr lang="en-US" sz="1600" b="1" kern="1200" dirty="0">
+                        <a:rPr lang="en-US" sz="1200" b="1" kern="1200" dirty="0">
                           <a:solidFill>
                             <a:schemeClr val="dk1"/>
                           </a:solidFill>
@@ -8012,7 +8780,7 @@
                         </a:rPr>
                         <a:t>512x512</a:t>
                       </a:r>
-                      <a:endParaRPr lang="en-US" sz="1600" b="1" dirty="0"/>
+                      <a:endParaRPr lang="en-US" sz="1200" b="1" dirty="0"/>
                     </a:p>
                   </a:txBody>
                   <a:tcPr marT="45721" marB="45721">
@@ -8072,7 +8840,7 @@
                     <a:p>
                       <a:pPr algn="ctr"/>
                       <a:r>
-                        <a:rPr lang="en-US" sz="1600" b="1" dirty="0"/>
+                        <a:rPr lang="en-US" sz="1200" b="1" dirty="0"/>
                         <a:t>60</a:t>
                       </a:r>
                     </a:p>
@@ -8087,6 +8855,68 @@
                       <a:headEnd type="none" w="med" len="med"/>
                       <a:tailEnd type="none" w="med" len="med"/>
                     </a:lnL>
+                    <a:lnR w="12700" cap="flat" cmpd="sng" algn="ctr">
+                      <a:solidFill>
+                        <a:srgbClr val="486B7B"/>
+                      </a:solidFill>
+                      <a:prstDash val="solid"/>
+                      <a:round/>
+                      <a:headEnd type="none" w="med" len="med"/>
+                      <a:tailEnd type="none" w="med" len="med"/>
+                    </a:lnR>
+                    <a:lnT w="12700" cap="flat" cmpd="sng" algn="ctr">
+                      <a:solidFill>
+                        <a:srgbClr val="486B7B"/>
+                      </a:solidFill>
+                      <a:prstDash val="solid"/>
+                      <a:round/>
+                      <a:headEnd type="none" w="med" len="med"/>
+                      <a:tailEnd type="none" w="med" len="med"/>
+                    </a:lnT>
+                    <a:lnB w="12700" cap="flat" cmpd="sng" algn="ctr">
+                      <a:solidFill>
+                        <a:srgbClr val="486B7B"/>
+                      </a:solidFill>
+                      <a:prstDash val="solid"/>
+                      <a:round/>
+                      <a:headEnd type="none" w="med" len="med"/>
+                      <a:tailEnd type="none" w="med" len="med"/>
+                    </a:lnB>
+                    <a:lnTlToBr w="12700" cmpd="sng">
+                      <a:noFill/>
+                      <a:prstDash val="solid"/>
+                    </a:lnTlToBr>
+                    <a:lnBlToTr w="12700" cmpd="sng">
+                      <a:noFill/>
+                      <a:prstDash val="solid"/>
+                    </a:lnBlToTr>
+                    <a:solidFill>
+                      <a:schemeClr val="bg1"/>
+                    </a:solidFill>
+                  </a:tcPr>
+                </a:tc>
+                <a:tc>
+                  <a:txBody>
+                    <a:bodyPr/>
+                    <a:lstStyle/>
+                    <a:p>
+                      <a:pPr algn="ctr"/>
+                      <a:r>
+                        <a:rPr lang="en-US" sz="1200" dirty="0"/>
+                        <a:t>26.7</a:t>
+                      </a:r>
+                    </a:p>
+                  </a:txBody>
+                  <a:tcPr marT="45721" marB="45721">
+                    <a:lnL w="12700" cap="flat" cmpd="sng" algn="ctr">
+                      <a:solidFill>
+                        <a:srgbClr val="486B7B"/>
+                      </a:solidFill>
+                      <a:prstDash val="solid"/>
+                      <a:round/>
+                      <a:headEnd type="none" w="med" len="med"/>
+                      <a:tailEnd type="none" w="med" len="med"/>
+                    </a:lnL>
                     <a:lnR w="38100" cap="flat" cmpd="sng" algn="ctr">
                       <a:solidFill>
                         <a:srgbClr val="486B7B"/>
@@ -8134,7 +8964,7 @@
                     <a:p>
                       <a:pPr algn="ctr"/>
                       <a:r>
-                        <a:rPr lang="en-US" sz="1600" dirty="0"/>
+                        <a:rPr lang="en-US" sz="1200" dirty="0"/>
                         <a:t>303104</a:t>
                       </a:r>
                     </a:p>
@@ -8212,7 +9042,7 @@
                         <a:defRPr/>
                       </a:pPr>
                       <a:r>
-                        <a:rPr lang="en-US" sz="1600" dirty="0"/>
+                        <a:rPr lang="en-US" sz="1200" dirty="0"/>
                         <a:t>13.2</a:t>
                       </a:r>
                     </a:p>
@@ -8245,7 +9075,7 @@
                       <a:headEnd type="none" w="med" len="med"/>
                       <a:tailEnd type="none" w="med" len="med"/>
                     </a:lnT>
-                    <a:lnB w="19050" cap="flat" cmpd="sng" algn="ctr">
+                    <a:lnB w="12700" cap="flat" cmpd="sng" algn="ctr">
                       <a:solidFill>
                         <a:srgbClr val="486B7B"/>
                       </a:solidFill>
@@ -8274,7 +9104,7 @@
                     <a:p>
                       <a:pPr algn="ctr"/>
                       <a:r>
-                        <a:rPr lang="en-US" sz="1600" dirty="0"/>
+                        <a:rPr lang="en-US" sz="1200" dirty="0"/>
                         <a:t>282624</a:t>
                       </a:r>
                     </a:p>
@@ -8352,7 +9182,7 @@
                         <a:defRPr/>
                       </a:pPr>
                       <a:r>
-                        <a:rPr lang="en-US" sz="1600" dirty="0"/>
+                        <a:rPr lang="en-US" sz="1200" dirty="0"/>
                         <a:t>19.5</a:t>
                       </a:r>
                     </a:p>
@@ -8413,7 +9243,7 @@
                   </a:ext>
                 </a:extLst>
               </a:tr>
-              <a:tr h="342900">
+              <a:tr h="265334">
                 <a:tc>
                   <a:txBody>
                     <a:bodyPr/>
@@ -8421,7 +9251,7 @@
                     <a:p>
                       <a:pPr algn="ctr"/>
                       <a:r>
-                        <a:rPr lang="en-US" sz="1600" b="1" kern="1200" dirty="0">
+                        <a:rPr lang="en-US" sz="1200" b="1" kern="1200" dirty="0">
                           <a:solidFill>
                             <a:schemeClr val="dk1"/>
                           </a:solidFill>
@@ -8429,7 +9259,7 @@
                         </a:rPr>
                         <a:t>512x512</a:t>
                       </a:r>
-                      <a:endParaRPr lang="en-US" sz="1600" b="1" dirty="0"/>
+                      <a:endParaRPr lang="en-US" sz="1200" b="1" dirty="0"/>
                     </a:p>
                   </a:txBody>
                   <a:tcPr marT="45721" marB="45721">
@@ -8489,7 +9319,7 @@
                     <a:p>
                       <a:pPr algn="ctr"/>
                       <a:r>
-                        <a:rPr lang="en-US" sz="1600" b="1" dirty="0"/>
+                        <a:rPr lang="en-US" sz="1200" b="1" dirty="0"/>
                         <a:t>50</a:t>
                       </a:r>
                     </a:p>
@@ -8504,6 +9334,68 @@
                       <a:headEnd type="none" w="med" len="med"/>
                       <a:tailEnd type="none" w="med" len="med"/>
                     </a:lnL>
+                    <a:lnR w="12700" cap="flat" cmpd="sng" algn="ctr">
+                      <a:solidFill>
+                        <a:srgbClr val="486B7B"/>
+                      </a:solidFill>
+                      <a:prstDash val="solid"/>
+                      <a:round/>
+                      <a:headEnd type="none" w="med" len="med"/>
+                      <a:tailEnd type="none" w="med" len="med"/>
+                    </a:lnR>
+                    <a:lnT w="12700" cap="flat" cmpd="sng" algn="ctr">
+                      <a:solidFill>
+                        <a:srgbClr val="486B7B"/>
+                      </a:solidFill>
+                      <a:prstDash val="solid"/>
+                      <a:round/>
+                      <a:headEnd type="none" w="med" len="med"/>
+                      <a:tailEnd type="none" w="med" len="med"/>
+                    </a:lnT>
+                    <a:lnB w="12700" cap="flat" cmpd="sng" algn="ctr">
+                      <a:solidFill>
+                        <a:srgbClr val="486B7B"/>
+                      </a:solidFill>
+                      <a:prstDash val="solid"/>
+                      <a:round/>
+                      <a:headEnd type="none" w="med" len="med"/>
+                      <a:tailEnd type="none" w="med" len="med"/>
+                    </a:lnB>
+                    <a:lnTlToBr w="12700" cmpd="sng">
+                      <a:noFill/>
+                      <a:prstDash val="solid"/>
+                    </a:lnTlToBr>
+                    <a:lnBlToTr w="12700" cmpd="sng">
+                      <a:noFill/>
+                      <a:prstDash val="solid"/>
+                    </a:lnBlToTr>
+                    <a:solidFill>
+                      <a:schemeClr val="bg1"/>
+                    </a:solidFill>
+                  </a:tcPr>
+                </a:tc>
+                <a:tc>
+                  <a:txBody>
+                    <a:bodyPr/>
+                    <a:lstStyle/>
+                    <a:p>
+                      <a:pPr algn="ctr"/>
+                      <a:r>
+                        <a:rPr lang="en-US" sz="1200" dirty="0"/>
+                        <a:t>28.0</a:t>
+                      </a:r>
+                    </a:p>
+                  </a:txBody>
+                  <a:tcPr marT="45721" marB="45721">
+                    <a:lnL w="12700" cap="flat" cmpd="sng" algn="ctr">
+                      <a:solidFill>
+                        <a:srgbClr val="486B7B"/>
+                      </a:solidFill>
+                      <a:prstDash val="solid"/>
+                      <a:round/>
+                      <a:headEnd type="none" w="med" len="med"/>
+                      <a:tailEnd type="none" w="med" len="med"/>
+                    </a:lnL>
                     <a:lnR w="38100" cap="flat" cmpd="sng" algn="ctr">
                       <a:solidFill>
                         <a:srgbClr val="486B7B"/>
@@ -8551,7 +9443,7 @@
                     <a:p>
                       <a:pPr algn="ctr"/>
                       <a:r>
-                        <a:rPr lang="en-US" sz="1600" dirty="0"/>
+                        <a:rPr lang="en-US" sz="1200" dirty="0"/>
                         <a:t>303104</a:t>
                       </a:r>
                     </a:p>
@@ -8629,7 +9521,7 @@
                         <a:defRPr/>
                       </a:pPr>
                       <a:r>
-                        <a:rPr lang="en-US" sz="1600" dirty="0"/>
+                        <a:rPr lang="en-US" sz="1200" dirty="0"/>
                         <a:t>14.5</a:t>
                       </a:r>
                     </a:p>
@@ -8653,7 +9545,7 @@
                       <a:headEnd type="none" w="med" len="med"/>
                       <a:tailEnd type="none" w="med" len="med"/>
                     </a:lnR>
-                    <a:lnT w="19050" cap="flat" cmpd="sng" algn="ctr">
+                    <a:lnT w="12700" cap="flat" cmpd="sng" algn="ctr">
                       <a:solidFill>
                         <a:srgbClr val="486B7B"/>
                       </a:solidFill>
@@ -8691,7 +9583,7 @@
                     <a:p>
                       <a:pPr algn="ctr"/>
                       <a:r>
-                        <a:rPr lang="en-US" sz="1600" dirty="0"/>
+                        <a:rPr lang="en-US" sz="1200" dirty="0"/>
                         <a:t>282624</a:t>
                       </a:r>
                     </a:p>
@@ -8769,7 +9661,7 @@
                         <a:defRPr/>
                       </a:pPr>
                       <a:r>
-                        <a:rPr lang="en-US" sz="1600" dirty="0"/>
+                        <a:rPr lang="en-US" sz="1200" dirty="0"/>
                         <a:t>20.8</a:t>
                       </a:r>
                     </a:p>
@@ -8830,7 +9722,7 @@
                   </a:ext>
                 </a:extLst>
               </a:tr>
-              <a:tr h="342900">
+              <a:tr h="265334">
                 <a:tc>
                   <a:txBody>
                     <a:bodyPr/>
@@ -8838,7 +9730,7 @@
                     <a:p>
                       <a:pPr algn="ctr"/>
                       <a:r>
-                        <a:rPr lang="en-US" sz="1600" b="1" kern="1200" dirty="0">
+                        <a:rPr lang="en-US" sz="1200" b="1" kern="1200" dirty="0">
                           <a:solidFill>
                             <a:schemeClr val="dk1"/>
                           </a:solidFill>
@@ -8846,7 +9738,7 @@
                         </a:rPr>
                         <a:t>512x512</a:t>
                       </a:r>
-                      <a:endParaRPr lang="en-US" sz="1600" b="1" dirty="0"/>
+                      <a:endParaRPr lang="en-US" sz="1200" b="1" dirty="0"/>
                     </a:p>
                   </a:txBody>
                   <a:tcPr marT="45721" marB="45721">
@@ -8906,7 +9798,7 @@
                     <a:p>
                       <a:pPr algn="ctr"/>
                       <a:r>
-                        <a:rPr lang="en-US" sz="1600" b="1" dirty="0"/>
+                        <a:rPr lang="en-US" sz="1200" b="1" dirty="0"/>
                         <a:t>30</a:t>
                       </a:r>
                     </a:p>
@@ -8921,6 +9813,68 @@
                       <a:headEnd type="none" w="med" len="med"/>
                       <a:tailEnd type="none" w="med" len="med"/>
                     </a:lnL>
+                    <a:lnR w="12700" cap="flat" cmpd="sng" algn="ctr">
+                      <a:solidFill>
+                        <a:srgbClr val="486B7B"/>
+                      </a:solidFill>
+                      <a:prstDash val="solid"/>
+                      <a:round/>
+                      <a:headEnd type="none" w="med" len="med"/>
+                      <a:tailEnd type="none" w="med" len="med"/>
+                    </a:lnR>
+                    <a:lnT w="12700" cap="flat" cmpd="sng" algn="ctr">
+                      <a:solidFill>
+                        <a:srgbClr val="486B7B"/>
+                      </a:solidFill>
+                      <a:prstDash val="solid"/>
+                      <a:round/>
+                      <a:headEnd type="none" w="med" len="med"/>
+                      <a:tailEnd type="none" w="med" len="med"/>
+                    </a:lnT>
+                    <a:lnB w="12700" cap="flat" cmpd="sng" algn="ctr">
+                      <a:solidFill>
+                        <a:srgbClr val="486B7B"/>
+                      </a:solidFill>
+                      <a:prstDash val="solid"/>
+                      <a:round/>
+                      <a:headEnd type="none" w="med" len="med"/>
+                      <a:tailEnd type="none" w="med" len="med"/>
+                    </a:lnB>
+                    <a:lnTlToBr w="12700" cmpd="sng">
+                      <a:noFill/>
+                      <a:prstDash val="solid"/>
+                    </a:lnTlToBr>
+                    <a:lnBlToTr w="12700" cmpd="sng">
+                      <a:noFill/>
+                      <a:prstDash val="solid"/>
+                    </a:lnBlToTr>
+                    <a:solidFill>
+                      <a:schemeClr val="bg1"/>
+                    </a:solidFill>
+                  </a:tcPr>
+                </a:tc>
+                <a:tc>
+                  <a:txBody>
+                    <a:bodyPr/>
+                    <a:lstStyle/>
+                    <a:p>
+                      <a:pPr algn="ctr"/>
+                      <a:r>
+                        <a:rPr lang="en-US" sz="1200" dirty="0"/>
+                        <a:t>50.0</a:t>
+                      </a:r>
+                    </a:p>
+                  </a:txBody>
+                  <a:tcPr marT="45721" marB="45721">
+                    <a:lnL w="12700" cap="flat" cmpd="sng" algn="ctr">
+                      <a:solidFill>
+                        <a:srgbClr val="486B7B"/>
+                      </a:solidFill>
+                      <a:prstDash val="solid"/>
+                      <a:round/>
+                      <a:headEnd type="none" w="med" len="med"/>
+                      <a:tailEnd type="none" w="med" len="med"/>
+                    </a:lnL>
                     <a:lnR w="38100" cap="flat" cmpd="sng" algn="ctr">
                       <a:solidFill>
                         <a:srgbClr val="486B7B"/>
@@ -8968,7 +9922,7 @@
                     <a:p>
                       <a:pPr algn="ctr"/>
                       <a:r>
-                        <a:rPr lang="en-US" sz="1600" dirty="0"/>
+                        <a:rPr lang="en-US" sz="1200" dirty="0"/>
                         <a:t>303104</a:t>
                       </a:r>
                     </a:p>
@@ -9046,7 +10000,7 @@
                         <a:defRPr/>
                       </a:pPr>
                       <a:r>
-                        <a:rPr lang="en-US" sz="1600" dirty="0"/>
+                        <a:rPr lang="en-US" sz="1200" dirty="0"/>
                         <a:t>36.5</a:t>
                       </a:r>
                     </a:p>
@@ -9108,7 +10062,7 @@
                     <a:p>
                       <a:pPr algn="ctr"/>
                       <a:r>
-                        <a:rPr lang="en-US" sz="1600" dirty="0"/>
+                        <a:rPr lang="en-US" sz="1200" dirty="0"/>
                         <a:t>282624</a:t>
                       </a:r>
                     </a:p>
@@ -9186,7 +10140,7 @@
                         <a:defRPr/>
                       </a:pPr>
                       <a:r>
-                        <a:rPr lang="en-US" sz="1600" dirty="0"/>
+                        <a:rPr lang="en-US" sz="1200" dirty="0"/>
                         <a:t>42.8</a:t>
                       </a:r>
                     </a:p>
@@ -9247,7 +10201,7 @@
                   </a:ext>
                 </a:extLst>
               </a:tr>
-              <a:tr h="342900">
+              <a:tr h="265334">
                 <a:tc>
                   <a:txBody>
                     <a:bodyPr/>
@@ -9255,7 +10209,7 @@
                     <a:p>
                       <a:pPr algn="ctr"/>
                       <a:r>
-                        <a:rPr lang="en-US" sz="1600" b="1" kern="1200" dirty="0">
+                        <a:rPr lang="en-US" sz="1200" b="1" kern="1200" dirty="0">
                           <a:solidFill>
                             <a:schemeClr val="dk1"/>
                           </a:solidFill>
@@ -9263,7 +10217,7 @@
                         </a:rPr>
                         <a:t>512x256</a:t>
                       </a:r>
-                      <a:endParaRPr lang="en-US" sz="1600" b="1" dirty="0"/>
+                      <a:endParaRPr lang="en-US" sz="1200" b="1" dirty="0"/>
                     </a:p>
                   </a:txBody>
                   <a:tcPr marT="45721" marB="45721">
@@ -9323,7 +10277,7 @@
                     <a:p>
                       <a:pPr algn="ctr"/>
                       <a:r>
-                        <a:rPr lang="en-US" sz="1600" b="1" dirty="0"/>
+                        <a:rPr lang="en-US" sz="1200" b="1" dirty="0"/>
                         <a:t>1000</a:t>
                       </a:r>
                     </a:p>
@@ -9338,6 +10292,68 @@
                       <a:headEnd type="none" w="med" len="med"/>
                       <a:tailEnd type="none" w="med" len="med"/>
                     </a:lnL>
+                    <a:lnR w="12700" cap="flat" cmpd="sng" algn="ctr">
+                      <a:solidFill>
+                        <a:srgbClr val="486B7B"/>
+                      </a:solidFill>
+                      <a:prstDash val="solid"/>
+                      <a:round/>
+                      <a:headEnd type="none" w="med" len="med"/>
+                      <a:tailEnd type="none" w="med" len="med"/>
+                    </a:lnR>
+                    <a:lnT w="12700" cap="flat" cmpd="sng" algn="ctr">
+                      <a:solidFill>
+                        <a:srgbClr val="486B7B"/>
+                      </a:solidFill>
+                      <a:prstDash val="solid"/>
+                      <a:round/>
+                      <a:headEnd type="none" w="med" len="med"/>
+                      <a:tailEnd type="none" w="med" len="med"/>
+                    </a:lnT>
+                    <a:lnB w="12700" cap="flat" cmpd="sng" algn="ctr">
+                      <a:solidFill>
+                        <a:srgbClr val="486B7B"/>
+                      </a:solidFill>
+                      <a:prstDash val="solid"/>
+                      <a:round/>
+                      <a:headEnd type="none" w="med" len="med"/>
+                      <a:tailEnd type="none" w="med" len="med"/>
+                    </a:lnB>
+                    <a:lnTlToBr w="12700" cmpd="sng">
+                      <a:noFill/>
+                      <a:prstDash val="solid"/>
+                    </a:lnTlToBr>
+                    <a:lnBlToTr w="12700" cmpd="sng">
+                      <a:noFill/>
+                      <a:prstDash val="solid"/>
+                    </a:lnBlToTr>
+                    <a:solidFill>
+                      <a:schemeClr val="bg1"/>
+                    </a:solidFill>
+                  </a:tcPr>
+                </a:tc>
+                <a:tc>
+                  <a:txBody>
+                    <a:bodyPr/>
+                    <a:lstStyle/>
+                    <a:p>
+                      <a:pPr algn="ctr"/>
+                      <a:r>
+                        <a:rPr lang="en-US" sz="1200" dirty="0"/>
+                        <a:t>12.3</a:t>
+                      </a:r>
+                    </a:p>
+                  </a:txBody>
+                  <a:tcPr marT="45721" marB="45721">
+                    <a:lnL w="12700" cap="flat" cmpd="sng" algn="ctr">
+                      <a:solidFill>
+                        <a:srgbClr val="486B7B"/>
+                      </a:solidFill>
+                      <a:prstDash val="solid"/>
+                      <a:round/>
+                      <a:headEnd type="none" w="med" len="med"/>
+                      <a:tailEnd type="none" w="med" len="med"/>
+                    </a:lnL>
                     <a:lnR w="38100" cap="flat" cmpd="sng" algn="ctr">
                       <a:solidFill>
                         <a:srgbClr val="486B7B"/>
@@ -9385,7 +10401,7 @@
                     <a:p>
                       <a:pPr algn="ctr"/>
                       <a:r>
-                        <a:rPr lang="en-US" sz="1600" dirty="0"/>
+                        <a:rPr lang="en-US" sz="1200" dirty="0"/>
                         <a:t>151552</a:t>
                       </a:r>
                     </a:p>
@@ -9447,7 +10463,7 @@
                     <a:p>
                       <a:pPr algn="ctr"/>
                       <a:r>
-                        <a:rPr lang="en-US" sz="1600" dirty="0"/>
+                        <a:rPr lang="en-US" sz="1200" dirty="0"/>
                         <a:t>-1.2</a:t>
                       </a:r>
                     </a:p>
@@ -9509,7 +10525,7 @@
                     <a:p>
                       <a:pPr algn="ctr"/>
                       <a:r>
-                        <a:rPr lang="en-US" sz="1600" dirty="0"/>
+                        <a:rPr lang="en-US" sz="1200" dirty="0"/>
                         <a:t>141312</a:t>
                       </a:r>
                     </a:p>
@@ -9571,7 +10587,7 @@
                     <a:p>
                       <a:pPr algn="ctr"/>
                       <a:r>
-                        <a:rPr lang="en-US" sz="1600" dirty="0"/>
+                        <a:rPr lang="en-US" sz="1200" dirty="0"/>
                         <a:t>5.1</a:t>
                       </a:r>
                     </a:p>
@@ -9632,7 +10648,7 @@
                   </a:ext>
                 </a:extLst>
               </a:tr>
-              <a:tr h="342900">
+              <a:tr h="265334">
                 <a:tc>
                   <a:txBody>
                     <a:bodyPr/>
@@ -9640,7 +10656,7 @@
                     <a:p>
                       <a:pPr algn="ctr"/>
                       <a:r>
-                        <a:rPr lang="en-US" sz="1600" b="1" kern="1200" dirty="0">
+                        <a:rPr lang="en-US" sz="1200" b="1" kern="1200" dirty="0">
                           <a:solidFill>
                             <a:schemeClr val="dk1"/>
                           </a:solidFill>
@@ -9648,7 +10664,7 @@
                         </a:rPr>
                         <a:t>512x256</a:t>
                       </a:r>
-                      <a:endParaRPr lang="en-US" sz="1600" b="1" dirty="0"/>
+                      <a:endParaRPr lang="en-US" sz="1200" b="1" dirty="0"/>
                     </a:p>
                   </a:txBody>
                   <a:tcPr marT="45721" marB="45721">
@@ -9708,7 +10724,7 @@
                     <a:p>
                       <a:pPr algn="ctr"/>
                       <a:r>
-                        <a:rPr lang="en-US" sz="1600" b="1" dirty="0"/>
+                        <a:rPr lang="en-US" sz="1200" b="1" dirty="0"/>
                         <a:t>500</a:t>
                       </a:r>
                     </a:p>
@@ -9723,6 +10739,68 @@
                       <a:headEnd type="none" w="med" len="med"/>
                       <a:tailEnd type="none" w="med" len="med"/>
                     </a:lnL>
+                    <a:lnR w="12700" cap="flat" cmpd="sng" algn="ctr">
+                      <a:solidFill>
+                        <a:srgbClr val="486B7B"/>
+                      </a:solidFill>
+                      <a:prstDash val="solid"/>
+                      <a:round/>
+                      <a:headEnd type="none" w="med" len="med"/>
+                      <a:tailEnd type="none" w="med" len="med"/>
+                    </a:lnR>
+                    <a:lnT w="12700" cap="flat" cmpd="sng" algn="ctr">
+                      <a:solidFill>
+                        <a:srgbClr val="486B7B"/>
+                      </a:solidFill>
+                      <a:prstDash val="solid"/>
+                      <a:round/>
+                      <a:headEnd type="none" w="med" len="med"/>
+                      <a:tailEnd type="none" w="med" len="med"/>
+                    </a:lnT>
+                    <a:lnB w="12700" cap="flat" cmpd="sng" algn="ctr">
+                      <a:solidFill>
+                        <a:srgbClr val="486B7B"/>
+                      </a:solidFill>
+                      <a:prstDash val="solid"/>
+                      <a:round/>
+                      <a:headEnd type="none" w="med" len="med"/>
+                      <a:tailEnd type="none" w="med" len="med"/>
+                    </a:lnB>
+                    <a:lnTlToBr w="12700" cmpd="sng">
+                      <a:noFill/>
+                      <a:prstDash val="solid"/>
+                    </a:lnTlToBr>
+                    <a:lnBlToTr w="12700" cmpd="sng">
+                      <a:noFill/>
+                      <a:prstDash val="solid"/>
+                    </a:lnBlToTr>
+                    <a:solidFill>
+                      <a:schemeClr val="bg1"/>
+                    </a:solidFill>
+                  </a:tcPr>
+                </a:tc>
+                <a:tc>
+                  <a:txBody>
+                    <a:bodyPr/>
+                    <a:lstStyle/>
+                    <a:p>
+                      <a:pPr algn="ctr"/>
+                      <a:r>
+                        <a:rPr lang="en-US" sz="1200" dirty="0"/>
+                        <a:t>48.8</a:t>
+                      </a:r>
+                    </a:p>
+                  </a:txBody>
+                  <a:tcPr marT="45721" marB="45721">
+                    <a:lnL w="12700" cap="flat" cmpd="sng" algn="ctr">
+                      <a:solidFill>
+                        <a:srgbClr val="486B7B"/>
+                      </a:solidFill>
+                      <a:prstDash val="solid"/>
+                      <a:round/>
+                      <a:headEnd type="none" w="med" len="med"/>
+                      <a:tailEnd type="none" w="med" len="med"/>
+                    </a:lnL>
                     <a:lnR w="38100" cap="flat" cmpd="sng" algn="ctr">
                       <a:solidFill>
                         <a:srgbClr val="486B7B"/>
@@ -9770,7 +10848,7 @@
                     <a:p>
                       <a:pPr algn="ctr"/>
                       <a:r>
-                        <a:rPr lang="en-US" sz="1600" dirty="0"/>
+                        <a:rPr lang="en-US" sz="1200" dirty="0"/>
                         <a:t>151552</a:t>
                       </a:r>
                     </a:p>
@@ -9848,7 +10926,7 @@
                         <a:defRPr/>
                       </a:pPr>
                       <a:r>
-                        <a:rPr lang="en-US" sz="1600" dirty="0"/>
+                        <a:rPr lang="en-US" sz="1200" dirty="0"/>
                         <a:t>35.3</a:t>
                       </a:r>
                     </a:p>
@@ -9910,7 +10988,7 @@
                     <a:p>
                       <a:pPr algn="ctr"/>
                       <a:r>
-                        <a:rPr lang="en-US" sz="1600" dirty="0"/>
+                        <a:rPr lang="en-US" sz="1200" dirty="0"/>
                         <a:t>141312</a:t>
                       </a:r>
                     </a:p>
@@ -9988,7 +11066,7 @@
                         <a:defRPr/>
                       </a:pPr>
                       <a:r>
-                        <a:rPr lang="en-US" sz="1600" dirty="0"/>
+                        <a:rPr lang="en-US" sz="1200" dirty="0"/>
                         <a:t>41.6</a:t>
                       </a:r>
                     </a:p>
@@ -10049,7 +11127,7 @@
                   </a:ext>
                 </a:extLst>
               </a:tr>
-              <a:tr h="342900">
+              <a:tr h="265334">
                 <a:tc>
                   <a:txBody>
                     <a:bodyPr/>
@@ -10057,7 +11135,7 @@
                     <a:p>
                       <a:pPr algn="ctr"/>
                       <a:r>
-                        <a:rPr lang="en-US" sz="1600" b="1" kern="1200" dirty="0">
+                        <a:rPr lang="en-US" sz="1200" b="1" kern="1200" dirty="0">
                           <a:solidFill>
                             <a:schemeClr val="dk1"/>
                           </a:solidFill>
@@ -10065,7 +11143,7 @@
                         </a:rPr>
                         <a:t>512x256</a:t>
                       </a:r>
-                      <a:endParaRPr lang="en-US" sz="1600" b="1" dirty="0"/>
+                      <a:endParaRPr lang="en-US" sz="1200" b="1" dirty="0"/>
                     </a:p>
                   </a:txBody>
                   <a:tcPr marT="45721" marB="45721">
@@ -10125,7 +11203,7 @@
                     <a:p>
                       <a:pPr algn="ctr"/>
                       <a:r>
-                        <a:rPr lang="en-US" sz="1600" b="1" dirty="0"/>
+                        <a:rPr lang="en-US" sz="1200" b="1" dirty="0"/>
                         <a:t>200</a:t>
                       </a:r>
                     </a:p>
@@ -10140,6 +11218,68 @@
                       <a:headEnd type="none" w="med" len="med"/>
                       <a:tailEnd type="none" w="med" len="med"/>
                     </a:lnL>
+                    <a:lnR w="12700" cap="flat" cmpd="sng" algn="ctr">
+                      <a:solidFill>
+                        <a:srgbClr val="486B7B"/>
+                      </a:solidFill>
+                      <a:prstDash val="solid"/>
+                      <a:round/>
+                      <a:headEnd type="none" w="med" len="med"/>
+                      <a:tailEnd type="none" w="med" len="med"/>
+                    </a:lnR>
+                    <a:lnT w="12700" cap="flat" cmpd="sng" algn="ctr">
+                      <a:solidFill>
+                        <a:srgbClr val="486B7B"/>
+                      </a:solidFill>
+                      <a:prstDash val="solid"/>
+                      <a:round/>
+                      <a:headEnd type="none" w="med" len="med"/>
+                      <a:tailEnd type="none" w="med" len="med"/>
+                    </a:lnT>
+                    <a:lnB w="12700" cap="flat" cmpd="sng" algn="ctr">
+                      <a:solidFill>
+                        <a:srgbClr val="486B7B"/>
+                      </a:solidFill>
+                      <a:prstDash val="solid"/>
+                      <a:round/>
+                      <a:headEnd type="none" w="med" len="med"/>
+                      <a:tailEnd type="none" w="med" len="med"/>
+                    </a:lnB>
+                    <a:lnTlToBr w="12700" cmpd="sng">
+                      <a:noFill/>
+                      <a:prstDash val="solid"/>
+                    </a:lnTlToBr>
+                    <a:lnBlToTr w="12700" cmpd="sng">
+                      <a:noFill/>
+                      <a:prstDash val="solid"/>
+                    </a:lnBlToTr>
+                    <a:solidFill>
+                      <a:schemeClr val="bg1"/>
+                    </a:solidFill>
+                  </a:tcPr>
+                </a:tc>
+                <a:tc>
+                  <a:txBody>
+                    <a:bodyPr/>
+                    <a:lstStyle/>
+                    <a:p>
+                      <a:pPr algn="ctr"/>
+                      <a:r>
+                        <a:rPr lang="en-US" sz="1200" dirty="0"/>
+                        <a:t>59.0</a:t>
+                      </a:r>
+                    </a:p>
+                  </a:txBody>
+                  <a:tcPr marT="45721" marB="45721">
+                    <a:lnL w="12700" cap="flat" cmpd="sng" algn="ctr">
+                      <a:solidFill>
+                        <a:srgbClr val="486B7B"/>
+                      </a:solidFill>
+                      <a:prstDash val="solid"/>
+                      <a:round/>
+                      <a:headEnd type="none" w="med" len="med"/>
+                      <a:tailEnd type="none" w="med" len="med"/>
+                    </a:lnL>
                     <a:lnR w="38100" cap="flat" cmpd="sng" algn="ctr">
                       <a:solidFill>
                         <a:srgbClr val="486B7B"/>
@@ -10187,7 +11327,7 @@
                     <a:p>
                       <a:pPr algn="ctr"/>
                       <a:r>
-                        <a:rPr lang="en-US" sz="1600" dirty="0"/>
+                        <a:rPr lang="en-US" sz="1200" dirty="0"/>
                         <a:t>151552</a:t>
                       </a:r>
                     </a:p>
@@ -10265,7 +11405,7 @@
                         <a:defRPr/>
                       </a:pPr>
                       <a:r>
-                        <a:rPr lang="en-US" sz="1600" dirty="0"/>
+                        <a:rPr lang="en-US" sz="1200" dirty="0"/>
                         <a:t>45.5</a:t>
                       </a:r>
                     </a:p>
@@ -10327,7 +11467,7 @@
                     <a:p>
                       <a:pPr algn="ctr"/>
                       <a:r>
-                        <a:rPr lang="en-US" sz="1600" dirty="0"/>
+                        <a:rPr lang="en-US" sz="1200" dirty="0"/>
                         <a:t>141312</a:t>
                       </a:r>
                     </a:p>
@@ -10405,7 +11545,7 @@
                         <a:defRPr/>
                       </a:pPr>
                       <a:r>
-                        <a:rPr lang="en-US" sz="1600" dirty="0"/>
+                        <a:rPr lang="en-US" sz="1200" dirty="0"/>
                         <a:t>51.8</a:t>
                       </a:r>
                     </a:p>
@@ -10466,7 +11606,7 @@
                   </a:ext>
                 </a:extLst>
               </a:tr>
-              <a:tr h="342900">
+              <a:tr h="265334">
                 <a:tc>
                   <a:txBody>
                     <a:bodyPr/>
@@ -10474,7 +11614,7 @@
                     <a:p>
                       <a:pPr algn="ctr"/>
                       <a:r>
-                        <a:rPr lang="en-US" sz="1600" b="1" kern="1200" dirty="0">
+                        <a:rPr lang="en-US" sz="1200" b="1" kern="1200" dirty="0">
                           <a:solidFill>
                             <a:schemeClr val="dk1"/>
                           </a:solidFill>
@@ -10482,7 +11622,7 @@
                         </a:rPr>
                         <a:t>512x256</a:t>
                       </a:r>
-                      <a:endParaRPr lang="en-US" sz="1600" b="1" dirty="0"/>
+                      <a:endParaRPr lang="en-US" sz="1200" b="1" dirty="0"/>
                     </a:p>
                   </a:txBody>
                   <a:tcPr marT="45721" marB="45721">
@@ -10542,7 +11682,7 @@
                     <a:p>
                       <a:pPr algn="ctr"/>
                       <a:r>
-                        <a:rPr lang="en-US" sz="1600" b="1" dirty="0"/>
+                        <a:rPr lang="en-US" sz="1200" b="1" dirty="0"/>
                         <a:t>100</a:t>
                       </a:r>
                     </a:p>
@@ -10557,6 +11697,68 @@
                       <a:headEnd type="none" w="med" len="med"/>
                       <a:tailEnd type="none" w="med" len="med"/>
                     </a:lnL>
+                    <a:lnR w="12700" cap="flat" cmpd="sng" algn="ctr">
+                      <a:solidFill>
+                        <a:srgbClr val="486B7B"/>
+                      </a:solidFill>
+                      <a:prstDash val="solid"/>
+                      <a:round/>
+                      <a:headEnd type="none" w="med" len="med"/>
+                      <a:tailEnd type="none" w="med" len="med"/>
+                    </a:lnR>
+                    <a:lnT w="12700" cap="flat" cmpd="sng" algn="ctr">
+                      <a:solidFill>
+                        <a:srgbClr val="486B7B"/>
+                      </a:solidFill>
+                      <a:prstDash val="solid"/>
+                      <a:round/>
+                      <a:headEnd type="none" w="med" len="med"/>
+                      <a:tailEnd type="none" w="med" len="med"/>
+                    </a:lnT>
+                    <a:lnB w="12700" cap="flat" cmpd="sng" algn="ctr">
+                      <a:solidFill>
+                        <a:srgbClr val="486B7B"/>
+                      </a:solidFill>
+                      <a:prstDash val="solid"/>
+                      <a:round/>
+                      <a:headEnd type="none" w="med" len="med"/>
+                      <a:tailEnd type="none" w="med" len="med"/>
+                    </a:lnB>
+                    <a:lnTlToBr w="12700" cmpd="sng">
+                      <a:noFill/>
+                      <a:prstDash val="solid"/>
+                    </a:lnTlToBr>
+                    <a:lnBlToTr w="12700" cmpd="sng">
+                      <a:noFill/>
+                      <a:prstDash val="solid"/>
+                    </a:lnBlToTr>
+                    <a:solidFill>
+                      <a:schemeClr val="bg1"/>
+                    </a:solidFill>
+                  </a:tcPr>
+                </a:tc>
+                <a:tc>
+                  <a:txBody>
+                    <a:bodyPr/>
+                    <a:lstStyle/>
+                    <a:p>
+                      <a:pPr algn="ctr"/>
+                      <a:r>
+                        <a:rPr lang="en-US" sz="1200" dirty="0"/>
+                        <a:t>59.0</a:t>
+                      </a:r>
+                    </a:p>
+                  </a:txBody>
+                  <a:tcPr marT="45721" marB="45721">
+                    <a:lnL w="12700" cap="flat" cmpd="sng" algn="ctr">
+                      <a:solidFill>
+                        <a:srgbClr val="486B7B"/>
+                      </a:solidFill>
+                      <a:prstDash val="solid"/>
+                      <a:round/>
+                      <a:headEnd type="none" w="med" len="med"/>
+                      <a:tailEnd type="none" w="med" len="med"/>
+                    </a:lnL>
                     <a:lnR w="38100" cap="flat" cmpd="sng" algn="ctr">
                       <a:solidFill>
                         <a:srgbClr val="486B7B"/>
@@ -10604,7 +11806,7 @@
                     <a:p>
                       <a:pPr algn="ctr"/>
                       <a:r>
-                        <a:rPr lang="en-US" sz="1600" dirty="0"/>
+                        <a:rPr lang="en-US" sz="1200" dirty="0"/>
                         <a:t>151552</a:t>
                       </a:r>
                     </a:p>
@@ -10682,7 +11884,7 @@
                         <a:defRPr/>
                       </a:pPr>
                       <a:r>
-                        <a:rPr lang="en-US" sz="1600" dirty="0"/>
+                        <a:rPr lang="en-US" sz="1200" dirty="0"/>
                         <a:t>45.5</a:t>
                       </a:r>
                     </a:p>
@@ -10744,7 +11946,7 @@
                     <a:p>
                       <a:pPr algn="ctr"/>
                       <a:r>
-                        <a:rPr lang="en-US" sz="1600" dirty="0"/>
+                        <a:rPr lang="en-US" sz="1200" dirty="0"/>
                         <a:t>141312</a:t>
                       </a:r>
                     </a:p>
@@ -10822,7 +12024,7 @@
                         <a:defRPr/>
                       </a:pPr>
                       <a:r>
-                        <a:rPr lang="en-US" sz="1600" dirty="0"/>
+                        <a:rPr lang="en-US" sz="1200" dirty="0"/>
                         <a:t>51.8</a:t>
                       </a:r>
                     </a:p>
@@ -10883,7 +12085,7 @@
                   </a:ext>
                 </a:extLst>
               </a:tr>
-              <a:tr h="342900">
+              <a:tr h="265334">
                 <a:tc>
                   <a:txBody>
                     <a:bodyPr/>
@@ -10891,7 +12093,7 @@
                     <a:p>
                       <a:pPr algn="ctr"/>
                       <a:r>
-                        <a:rPr lang="en-US" sz="1600" b="1" kern="1200" dirty="0">
+                        <a:rPr lang="en-US" sz="1200" b="1" kern="1200" dirty="0">
                           <a:solidFill>
                             <a:schemeClr val="dk1"/>
                           </a:solidFill>
@@ -10899,7 +12101,7 @@
                         </a:rPr>
                         <a:t>512x256</a:t>
                       </a:r>
-                      <a:endParaRPr lang="en-US" sz="1600" b="1" dirty="0"/>
+                      <a:endParaRPr lang="en-US" sz="1200" b="1" dirty="0"/>
                     </a:p>
                   </a:txBody>
                   <a:tcPr marT="45721" marB="45721">
@@ -10959,7 +12161,7 @@
                     <a:p>
                       <a:pPr algn="ctr"/>
                       <a:r>
-                        <a:rPr lang="en-US" sz="1600" b="1" dirty="0"/>
+                        <a:rPr lang="en-US" sz="1200" b="1" dirty="0"/>
                         <a:t>60</a:t>
                       </a:r>
                     </a:p>
@@ -10974,6 +12176,68 @@
                       <a:headEnd type="none" w="med" len="med"/>
                       <a:tailEnd type="none" w="med" len="med"/>
                     </a:lnL>
+                    <a:lnR w="12700" cap="flat" cmpd="sng" algn="ctr">
+                      <a:solidFill>
+                        <a:srgbClr val="486B7B"/>
+                      </a:solidFill>
+                      <a:prstDash val="solid"/>
+                      <a:round/>
+                      <a:headEnd type="none" w="med" len="med"/>
+                      <a:tailEnd type="none" w="med" len="med"/>
+                    </a:lnR>
+                    <a:lnT w="12700" cap="flat" cmpd="sng" algn="ctr">
+                      <a:solidFill>
+                        <a:srgbClr val="486B7B"/>
+                      </a:solidFill>
+                      <a:prstDash val="solid"/>
+                      <a:round/>
+                      <a:headEnd type="none" w="med" len="med"/>
+                      <a:tailEnd type="none" w="med" len="med"/>
+                    </a:lnT>
+                    <a:lnB w="12700" cap="flat" cmpd="sng" algn="ctr">
+                      <a:solidFill>
+                        <a:srgbClr val="486B7B"/>
+                      </a:solidFill>
+                      <a:prstDash val="solid"/>
+                      <a:round/>
+                      <a:headEnd type="none" w="med" len="med"/>
+                      <a:tailEnd type="none" w="med" len="med"/>
+                    </a:lnB>
+                    <a:lnTlToBr w="12700" cmpd="sng">
+                      <a:noFill/>
+                      <a:prstDash val="solid"/>
+                    </a:lnTlToBr>
+                    <a:lnBlToTr w="12700" cmpd="sng">
+                      <a:noFill/>
+                      <a:prstDash val="solid"/>
+                    </a:lnBlToTr>
+                    <a:solidFill>
+                      <a:schemeClr val="bg1"/>
+                    </a:solidFill>
+                  </a:tcPr>
+                </a:tc>
+                <a:tc>
+                  <a:txBody>
+                    <a:bodyPr/>
+                    <a:lstStyle/>
+                    <a:p>
+                      <a:pPr algn="ctr"/>
+                      <a:r>
+                        <a:rPr lang="en-US" sz="1200" dirty="0"/>
+                        <a:t>59.0</a:t>
+                      </a:r>
+                    </a:p>
+                  </a:txBody>
+                  <a:tcPr marT="45721" marB="45721">
+                    <a:lnL w="12700" cap="flat" cmpd="sng" algn="ctr">
+                      <a:solidFill>
+                        <a:srgbClr val="486B7B"/>
+                      </a:solidFill>
+                      <a:prstDash val="solid"/>
+                      <a:round/>
+                      <a:headEnd type="none" w="med" len="med"/>
+                      <a:tailEnd type="none" w="med" len="med"/>
+                    </a:lnL>
                     <a:lnR w="38100" cap="flat" cmpd="sng" algn="ctr">
                       <a:solidFill>
                         <a:srgbClr val="486B7B"/>
@@ -11021,7 +12285,7 @@
                     <a:p>
                       <a:pPr algn="ctr"/>
                       <a:r>
-                        <a:rPr lang="en-US" sz="1600" dirty="0"/>
+                        <a:rPr lang="en-US" sz="1200" dirty="0"/>
                         <a:t>151552</a:t>
                       </a:r>
                     </a:p>
@@ -11099,7 +12363,7 @@
                         <a:defRPr/>
                       </a:pPr>
                       <a:r>
-                        <a:rPr lang="en-US" sz="1600" dirty="0"/>
+                        <a:rPr lang="en-US" sz="1200" dirty="0"/>
                         <a:t>45.5</a:t>
                       </a:r>
                     </a:p>
@@ -11161,7 +12425,7 @@
                     <a:p>
                       <a:pPr algn="ctr"/>
                       <a:r>
-                        <a:rPr lang="en-US" sz="1600" dirty="0"/>
+                        <a:rPr lang="en-US" sz="1200" dirty="0"/>
                         <a:t>141312</a:t>
                       </a:r>
                     </a:p>
@@ -11239,7 +12503,7 @@
                         <a:defRPr/>
                       </a:pPr>
                       <a:r>
-                        <a:rPr lang="en-US" sz="1600" dirty="0"/>
+                        <a:rPr lang="en-US" sz="1200" dirty="0"/>
                         <a:t>51.8</a:t>
                       </a:r>
                     </a:p>

</xml_diff>